<commit_message>
poster update(completed intro,results section)
</commit_message>
<xml_diff>
--- a/documentation/WatechParkPoster(WIP).pptx
+++ b/documentation/WatechParkPoster(WIP).pptx
@@ -259,7 +259,7 @@
               <a:pPr>
                 <a:defRPr/>
               </a:pPr>
-              <a:t>3/31/2020</a:t>
+              <a:t>4/5/2020</a:t>
             </a:fld>
             <a:endParaRPr lang="en-US"/>
           </a:p>
@@ -836,7 +836,7 @@
               <a:pPr>
                 <a:defRPr/>
               </a:pPr>
-              <a:t>3/31/2020</a:t>
+              <a:t>4/5/2020</a:t>
             </a:fld>
             <a:endParaRPr lang="en-US"/>
           </a:p>
@@ -1071,7 +1071,7 @@
               <a:pPr>
                 <a:defRPr/>
               </a:pPr>
-              <a:t>3/31/2020</a:t>
+              <a:t>4/5/2020</a:t>
             </a:fld>
             <a:endParaRPr lang="en-US"/>
           </a:p>
@@ -1481,7 +1481,7 @@
               <a:pPr>
                 <a:defRPr/>
               </a:pPr>
-              <a:t>3/31/2020</a:t>
+              <a:t>4/5/2020</a:t>
             </a:fld>
             <a:endParaRPr lang="en-US"/>
           </a:p>
@@ -1831,7 +1831,7 @@
               <a:pPr>
                 <a:defRPr/>
               </a:pPr>
-              <a:t>3/31/2020</a:t>
+              <a:t>4/5/2020</a:t>
             </a:fld>
             <a:endParaRPr lang="en-US"/>
           </a:p>
@@ -2321,7 +2321,7 @@
               <a:pPr>
                 <a:defRPr/>
               </a:pPr>
-              <a:t>3/31/2020</a:t>
+              <a:t>4/5/2020</a:t>
             </a:fld>
             <a:endParaRPr lang="en-US"/>
           </a:p>
@@ -2497,7 +2497,7 @@
               <a:pPr>
                 <a:defRPr/>
               </a:pPr>
-              <a:t>3/31/2020</a:t>
+              <a:t>4/5/2020</a:t>
             </a:fld>
             <a:endParaRPr lang="en-US"/>
           </a:p>
@@ -2643,7 +2643,7 @@
               <a:pPr>
                 <a:defRPr/>
               </a:pPr>
-              <a:t>3/31/2020</a:t>
+              <a:t>4/5/2020</a:t>
             </a:fld>
             <a:endParaRPr lang="en-US"/>
           </a:p>
@@ -2978,7 +2978,7 @@
               <a:pPr>
                 <a:defRPr/>
               </a:pPr>
-              <a:t>3/31/2020</a:t>
+              <a:t>4/5/2020</a:t>
             </a:fld>
             <a:endParaRPr lang="en-US"/>
           </a:p>
@@ -3296,7 +3296,7 @@
               <a:pPr>
                 <a:defRPr/>
               </a:pPr>
-              <a:t>3/31/2020</a:t>
+              <a:t>4/5/2020</a:t>
             </a:fld>
             <a:endParaRPr lang="en-US"/>
           </a:p>
@@ -4236,8 +4236,8 @@
         </p:nvSpPr>
         <p:spPr bwMode="auto">
           <a:xfrm>
-            <a:off x="381000" y="20421600"/>
-            <a:ext cx="10591800" cy="11734800"/>
+            <a:off x="381000" y="20955000"/>
+            <a:ext cx="10591800" cy="11201400"/>
           </a:xfrm>
           <a:prstGeom prst="rect">
             <a:avLst/>
@@ -4293,7 +4293,7 @@
               </a:spcBef>
             </a:pPr>
             <a:r>
-              <a:rPr lang="en-US" sz="2800" b="1" dirty="0">
+              <a:rPr lang="en-US" sz="3200" b="1" u="sng" dirty="0">
                 <a:solidFill>
                   <a:schemeClr val="accent1">
                     <a:lumMod val="90000"/>
@@ -4317,31 +4317,6 @@
                 <a:spcPct val="50000"/>
               </a:spcBef>
             </a:pPr>
-            <a:r>
-              <a:rPr lang="en-US" sz="2800" dirty="0">
-                <a:solidFill>
-                  <a:schemeClr val="accent1">
-                    <a:lumMod val="90000"/>
-                    <a:lumOff val="10000"/>
-                  </a:schemeClr>
-                </a:solidFill>
-                <a:effectLst>
-                  <a:outerShdw blurRad="38100" dist="38100" dir="2700000" algn="tl">
-                    <a:srgbClr val="000000">
-                      <a:alpha val="43137"/>
-                    </a:srgbClr>
-                  </a:outerShdw>
-                </a:effectLst>
-              </a:rPr>
-              <a:t>(WORK IN PROGRESS)</a:t>
-            </a:r>
-          </a:p>
-          <a:p>
-            <a:pPr>
-              <a:spcBef>
-                <a:spcPct val="50000"/>
-              </a:spcBef>
-            </a:pPr>
             <a:endParaRPr lang="en-US" sz="2800" b="1" dirty="0">
               <a:solidFill>
                 <a:schemeClr val="accent1">
@@ -4364,8 +4339,92 @@
                 <a:spcPct val="50000"/>
               </a:spcBef>
             </a:pPr>
-            <a:r>
-              <a:rPr lang="en-US" sz="2800" b="1" dirty="0">
+            <a:endParaRPr lang="en-US" sz="2000" dirty="0"/>
+          </a:p>
+          <a:p>
+            <a:pPr marL="342900" indent="-342900">
+              <a:spcBef>
+                <a:spcPct val="50000"/>
+              </a:spcBef>
+              <a:buFontTx/>
+              <a:buChar char="-"/>
+            </a:pPr>
+            <a:endParaRPr lang="en-US" sz="2000" dirty="0"/>
+          </a:p>
+          <a:p>
+            <a:pPr>
+              <a:spcBef>
+                <a:spcPct val="50000"/>
+              </a:spcBef>
+            </a:pPr>
+            <a:endParaRPr lang="en-US" sz="3200" b="1" dirty="0">
+              <a:solidFill>
+                <a:schemeClr val="accent1">
+                  <a:lumMod val="90000"/>
+                  <a:lumOff val="10000"/>
+                </a:schemeClr>
+              </a:solidFill>
+              <a:effectLst>
+                <a:outerShdw blurRad="38100" dist="38100" dir="2700000" algn="tl">
+                  <a:srgbClr val="000000">
+                    <a:alpha val="43137"/>
+                  </a:srgbClr>
+                </a:outerShdw>
+              </a:effectLst>
+            </a:endParaRPr>
+          </a:p>
+          <a:p>
+            <a:pPr>
+              <a:spcBef>
+                <a:spcPct val="50000"/>
+              </a:spcBef>
+            </a:pPr>
+            <a:endParaRPr lang="en-US" sz="3200" b="1" dirty="0">
+              <a:solidFill>
+                <a:schemeClr val="accent1">
+                  <a:lumMod val="90000"/>
+                  <a:lumOff val="10000"/>
+                </a:schemeClr>
+              </a:solidFill>
+              <a:effectLst>
+                <a:outerShdw blurRad="38100" dist="38100" dir="2700000" algn="tl">
+                  <a:srgbClr val="000000">
+                    <a:alpha val="43137"/>
+                  </a:srgbClr>
+                </a:outerShdw>
+              </a:effectLst>
+            </a:endParaRPr>
+          </a:p>
+          <a:p>
+            <a:pPr>
+              <a:spcBef>
+                <a:spcPct val="50000"/>
+              </a:spcBef>
+            </a:pPr>
+            <a:endParaRPr lang="en-US" sz="3200" b="1" dirty="0">
+              <a:solidFill>
+                <a:schemeClr val="accent1">
+                  <a:lumMod val="90000"/>
+                  <a:lumOff val="10000"/>
+                </a:schemeClr>
+              </a:solidFill>
+              <a:effectLst>
+                <a:outerShdw blurRad="38100" dist="38100" dir="2700000" algn="tl">
+                  <a:srgbClr val="000000">
+                    <a:alpha val="43137"/>
+                  </a:srgbClr>
+                </a:outerShdw>
+              </a:effectLst>
+            </a:endParaRPr>
+          </a:p>
+          <a:p>
+            <a:pPr>
+              <a:spcBef>
+                <a:spcPct val="50000"/>
+              </a:spcBef>
+            </a:pPr>
+            <a:r>
+              <a:rPr lang="en-US" sz="3200" b="1" u="sng" dirty="0">
                 <a:solidFill>
                   <a:schemeClr val="accent1">
                     <a:lumMod val="90000"/>
@@ -4382,6 +4441,15 @@
               </a:rPr>
               <a:t>Required Resources/Tools:</a:t>
             </a:r>
+            <a:endParaRPr lang="en-US" sz="2400" b="1" u="sng" dirty="0">
+              <a:effectLst>
+                <a:outerShdw blurRad="38100" dist="38100" dir="2700000" algn="tl">
+                  <a:srgbClr val="000000">
+                    <a:alpha val="43137"/>
+                  </a:srgbClr>
+                </a:outerShdw>
+              </a:effectLst>
+            </a:endParaRPr>
           </a:p>
           <a:p>
             <a:pPr>
@@ -4390,36 +4458,9 @@
               </a:spcBef>
             </a:pPr>
             <a:r>
-              <a:rPr lang="en-US" sz="2000" dirty="0"/>
-              <a:t>The tools used to complete the project ranged from the initial design, development, testing and presentation phase of the overall end product.</a:t>
-            </a:r>
-          </a:p>
-          <a:p>
-            <a:pPr>
-              <a:spcBef>
-                <a:spcPct val="50000"/>
-              </a:spcBef>
-            </a:pPr>
-            <a:r>
-              <a:rPr lang="en-US" sz="2000" b="1" dirty="0"/>
-              <a:t>Parts(Sensors/Effectors):</a:t>
-            </a:r>
-          </a:p>
-          <a:p>
-            <a:pPr marL="342900" indent="-342900">
-              <a:spcBef>
-                <a:spcPct val="50000"/>
-              </a:spcBef>
-              <a:buFontTx/>
-              <a:buChar char="-"/>
-            </a:pPr>
-            <a:r>
-              <a:rPr lang="en-US" sz="2000" b="1" dirty="0">
+              <a:rPr lang="en-US" sz="2400" b="1" dirty="0">
                 <a:solidFill>
-                  <a:schemeClr val="accent1">
-                    <a:lumMod val="90000"/>
-                    <a:lumOff val="10000"/>
-                  </a:schemeClr>
+                  <a:srgbClr val="052754"/>
                 </a:solidFill>
                 <a:effectLst>
                   <a:outerShdw blurRad="38100" dist="38100" dir="2700000" algn="tl">
@@ -4429,22 +4470,87 @@
                   </a:outerShdw>
                 </a:effectLst>
               </a:rPr>
+              <a:t>Parts:</a:t>
+            </a:r>
+          </a:p>
+          <a:p>
+            <a:pPr>
+              <a:spcBef>
+                <a:spcPts val="0"/>
+              </a:spcBef>
+            </a:pPr>
+            <a:r>
+              <a:rPr lang="en-US" sz="2200" dirty="0"/>
+              <a:t>-</a:t>
+            </a:r>
+            <a:r>
+              <a:rPr lang="en-US" sz="2200" b="1" dirty="0"/>
+              <a:t> </a:t>
+            </a:r>
+            <a:r>
+              <a:rPr lang="en-US" sz="2200" b="1" dirty="0">
+                <a:effectLst>
+                  <a:outerShdw blurRad="38100" dist="38100" dir="2700000" algn="tl">
+                    <a:srgbClr val="000000">
+                      <a:alpha val="43137"/>
+                    </a:srgbClr>
+                  </a:outerShdw>
+                </a:effectLst>
+              </a:rPr>
+              <a:t>  </a:t>
+            </a:r>
+            <a:r>
+              <a:rPr lang="en-US" sz="2000" b="1" dirty="0"/>
               <a:t>VCNL4010 Proximity Sensor</a:t>
             </a:r>
           </a:p>
           <a:p>
             <a:pPr>
               <a:spcBef>
-                <a:spcPct val="50000"/>
+                <a:spcPts val="0"/>
               </a:spcBef>
             </a:pPr>
             <a:r>
-              <a:rPr lang="en-US" sz="2000" b="1" dirty="0">
+              <a:rPr lang="en-US" sz="2000" b="1" dirty="0"/>
+              <a:t>-   IR Break-Beam Sensor</a:t>
+            </a:r>
+          </a:p>
+          <a:p>
+            <a:pPr marL="342900" indent="-342900">
+              <a:spcBef>
+                <a:spcPts val="0"/>
+              </a:spcBef>
+              <a:buFontTx/>
+              <a:buChar char="-"/>
+            </a:pPr>
+            <a:r>
+              <a:rPr lang="en-US" sz="2000" b="1" dirty="0"/>
+              <a:t>PCA9685 Servo Controller</a:t>
+            </a:r>
+          </a:p>
+          <a:p>
+            <a:pPr marL="342900" indent="-342900">
+              <a:spcBef>
+                <a:spcPts val="0"/>
+              </a:spcBef>
+              <a:buFontTx/>
+              <a:buChar char="-"/>
+            </a:pPr>
+            <a:r>
+              <a:rPr lang="en-US" sz="2000" b="1" dirty="0"/>
+              <a:t>2 Micro Servo Motors(entry/exit gate control)</a:t>
+            </a:r>
+          </a:p>
+          <a:p>
+            <a:pPr>
+              <a:spcBef>
+                <a:spcPts val="0"/>
+              </a:spcBef>
+            </a:pPr>
+            <a:r>
+              <a:rPr lang="en-US" sz="2400" b="1" dirty="0">
                 <a:solidFill>
-                  <a:schemeClr val="accent1">
-                    <a:lumMod val="90000"/>
-                    <a:lumOff val="10000"/>
-                  </a:schemeClr>
+                  <a:srgbClr val="052754"/>
                 </a:solidFill>
                 <a:effectLst>
                   <a:outerShdw blurRad="38100" dist="38100" dir="2700000" algn="tl">
@@ -4454,24 +4560,51 @@
                   </a:outerShdw>
                 </a:effectLst>
               </a:rPr>
-              <a:t>-    IR Break-Beam Sensor</a:t>
+              <a:t>Tools/Materials : </a:t>
             </a:r>
           </a:p>
           <a:p>
             <a:pPr marL="342900" indent="-342900">
               <a:spcBef>
-                <a:spcPct val="50000"/>
+                <a:spcPts val="0"/>
               </a:spcBef>
               <a:buFontTx/>
               <a:buChar char="-"/>
             </a:pPr>
             <a:r>
-              <a:rPr lang="en-US" sz="2000" b="1" dirty="0">
+              <a:rPr lang="en-US" sz="2000" b="1" dirty="0"/>
+              <a:t>Wire cutters, soldering iron, solder material, helping hand, pin headers</a:t>
+            </a:r>
+          </a:p>
+          <a:p>
+            <a:pPr>
+              <a:spcBef>
+                <a:spcPts val="0"/>
+              </a:spcBef>
+            </a:pPr>
+            <a:endParaRPr lang="en-US" sz="2400" b="1" dirty="0">
+              <a:solidFill>
+                <a:srgbClr val="052754"/>
+              </a:solidFill>
+              <a:effectLst>
+                <a:outerShdw blurRad="38100" dist="38100" dir="2700000" algn="tl">
+                  <a:srgbClr val="000000">
+                    <a:alpha val="43137"/>
+                  </a:srgbClr>
+                </a:outerShdw>
+              </a:effectLst>
+            </a:endParaRPr>
+          </a:p>
+          <a:p>
+            <a:pPr>
+              <a:spcBef>
+                <a:spcPts val="0"/>
+              </a:spcBef>
+            </a:pPr>
+            <a:r>
+              <a:rPr lang="en-US" sz="2400" b="1" dirty="0">
                 <a:solidFill>
-                  <a:schemeClr val="accent1">
-                    <a:lumMod val="90000"/>
-                    <a:lumOff val="10000"/>
-                  </a:schemeClr>
+                  <a:srgbClr val="052754"/>
                 </a:solidFill>
                 <a:effectLst>
                   <a:outerShdw blurRad="38100" dist="38100" dir="2700000" algn="tl">
@@ -4481,7 +4614,37 @@
                   </a:outerShdw>
                 </a:effectLst>
               </a:rPr>
-              <a:t>PCA9685 Servo Controller</a:t>
+              <a:t>Facilities/People:</a:t>
+            </a:r>
+          </a:p>
+          <a:p>
+            <a:pPr>
+              <a:spcBef>
+                <a:spcPts val="0"/>
+              </a:spcBef>
+            </a:pPr>
+            <a:endParaRPr lang="en-US" sz="2400" b="1" dirty="0">
+              <a:solidFill>
+                <a:srgbClr val="052754"/>
+              </a:solidFill>
+              <a:effectLst>
+                <a:outerShdw blurRad="38100" dist="38100" dir="2700000" algn="tl">
+                  <a:srgbClr val="000000">
+                    <a:alpha val="43137"/>
+                  </a:srgbClr>
+                </a:outerShdw>
+              </a:effectLst>
+            </a:endParaRPr>
+          </a:p>
+          <a:p>
+            <a:pPr>
+              <a:spcBef>
+                <a:spcPts val="0"/>
+              </a:spcBef>
+            </a:pPr>
+            <a:r>
+              <a:rPr lang="en-US" sz="2000" b="1" dirty="0"/>
+              <a:t>The prototype lab in Humber College is the main source of providing the services to etch the PCB board during its final stages of production. Adjustments were made to hardware designs/parts along with the help of Vlad and Kelly whom were present to help.</a:t>
             </a:r>
           </a:p>
           <a:p>
@@ -4490,24 +4653,7 @@
                 <a:spcPct val="50000"/>
               </a:spcBef>
             </a:pPr>
-            <a:r>
-              <a:rPr lang="en-US" sz="2800" b="1" dirty="0">
-                <a:solidFill>
-                  <a:schemeClr val="accent1">
-                    <a:lumMod val="90000"/>
-                    <a:lumOff val="10000"/>
-                  </a:schemeClr>
-                </a:solidFill>
-                <a:effectLst>
-                  <a:outerShdw blurRad="38100" dist="38100" dir="2700000" algn="tl">
-                    <a:srgbClr val="000000">
-                      <a:alpha val="43137"/>
-                    </a:srgbClr>
-                  </a:outerShdw>
-                </a:effectLst>
-              </a:rPr>
-              <a:t>-  </a:t>
-            </a:r>
+            <a:endParaRPr lang="en-US" sz="2150" dirty="0"/>
           </a:p>
           <a:p>
             <a:pPr>
@@ -4516,91 +4662,18 @@
               </a:spcBef>
             </a:pPr>
             <a:r>
-              <a:rPr lang="en-US" sz="2000" b="1" dirty="0"/>
-              <a:t>PCB (Printed Circuit Board) : (WORK IN PROGRESS)</a:t>
-            </a:r>
-          </a:p>
-          <a:p>
-            <a:pPr marL="342900" indent="-342900">
+              <a:rPr lang="en-US" sz="2150" dirty="0"/>
+              <a:t> </a:t>
+            </a:r>
+            <a:endParaRPr lang="en-US" sz="2150" b="1" dirty="0"/>
+          </a:p>
+          <a:p>
+            <a:pPr>
               <a:spcBef>
                 <a:spcPct val="50000"/>
               </a:spcBef>
-              <a:buFontTx/>
-              <a:buChar char="-"/>
-            </a:pPr>
-            <a:r>
-              <a:rPr lang="en-US" sz="2000" dirty="0"/>
-              <a:t>Wire cutters, soldering iron, solder material, helping hand, pin headers, </a:t>
-            </a:r>
-            <a:endParaRPr lang="en-US" sz="2000" b="1" dirty="0"/>
-          </a:p>
-          <a:p>
-            <a:pPr>
-              <a:spcBef>
-                <a:spcPct val="50000"/>
-              </a:spcBef>
-            </a:pPr>
-            <a:r>
-              <a:rPr lang="en-US" sz="2000" b="1" dirty="0"/>
-              <a:t>Facilities:</a:t>
-            </a:r>
-          </a:p>
-          <a:p>
-            <a:pPr>
-              <a:spcBef>
-                <a:spcPct val="50000"/>
-              </a:spcBef>
-            </a:pPr>
-            <a:r>
-              <a:rPr lang="en-US" sz="2000" dirty="0"/>
-              <a:t>The facilities used in the project, included the prototype lab in Humber College. This facility is the main source of providing the services to etch the PCB board during its final stages of production, as well as provide the laser-cutting services for the final enclosure design. This facility was used to solder the components, sensors together on the PCB and test the final design. </a:t>
-            </a:r>
-          </a:p>
-          <a:p>
-            <a:pPr>
-              <a:spcBef>
-                <a:spcPct val="50000"/>
-              </a:spcBef>
-            </a:pPr>
-            <a:r>
-              <a:rPr lang="en-US" sz="2000" dirty="0"/>
-              <a:t>The facility provided us with more viable options, recommendations and the best way to overcome any issue we were experiencing. This included, designing the PCB board, using the Fritzing software. Adjustments were made depending on the different scenarios, and based on the advice of Vlad and Kelly whom were present to help.</a:t>
-            </a:r>
-            <a:endParaRPr lang="en-US" sz="2000" b="1" dirty="0"/>
-          </a:p>
-          <a:p>
-            <a:pPr>
-              <a:spcBef>
-                <a:spcPct val="50000"/>
-              </a:spcBef>
-            </a:pPr>
-            <a:endParaRPr lang="en-US" sz="2000" b="1" dirty="0"/>
-          </a:p>
-          <a:p>
-            <a:pPr>
-              <a:spcBef>
-                <a:spcPct val="50000"/>
-              </a:spcBef>
-            </a:pPr>
-            <a:endParaRPr lang="en-US" sz="2000" dirty="0"/>
-          </a:p>
-          <a:p>
-            <a:pPr marL="342900" indent="-342900">
-              <a:spcBef>
-                <a:spcPct val="50000"/>
-              </a:spcBef>
-              <a:buFontTx/>
-              <a:buChar char="-"/>
-            </a:pPr>
-            <a:endParaRPr lang="en-US" sz="2000" dirty="0"/>
-          </a:p>
-          <a:p>
-            <a:pPr>
-              <a:spcBef>
-                <a:spcPct val="50000"/>
-              </a:spcBef>
-            </a:pPr>
-            <a:endParaRPr lang="en-US" sz="3200" b="1" dirty="0">
+            </a:pPr>
+            <a:endParaRPr lang="en-US" sz="2150" b="1" dirty="0">
               <a:solidFill>
                 <a:schemeClr val="accent1">
                   <a:lumMod val="90000"/>
@@ -4616,6 +4689,50 @@
               </a:effectLst>
             </a:endParaRPr>
           </a:p>
+          <a:p>
+            <a:pPr>
+              <a:spcBef>
+                <a:spcPct val="50000"/>
+              </a:spcBef>
+            </a:pPr>
+            <a:endParaRPr lang="en-US" sz="2150" b="1" u="sng" dirty="0">
+              <a:solidFill>
+                <a:schemeClr val="accent1">
+                  <a:lumMod val="90000"/>
+                  <a:lumOff val="10000"/>
+                </a:schemeClr>
+              </a:solidFill>
+              <a:effectLst>
+                <a:outerShdw blurRad="38100" dist="38100" dir="2700000" algn="tl">
+                  <a:srgbClr val="000000">
+                    <a:alpha val="43137"/>
+                  </a:srgbClr>
+                </a:outerShdw>
+              </a:effectLst>
+            </a:endParaRPr>
+          </a:p>
+          <a:p>
+            <a:pPr>
+              <a:spcBef>
+                <a:spcPct val="50000"/>
+              </a:spcBef>
+            </a:pPr>
+            <a:endParaRPr lang="en-US" sz="2400" b="1" u="sng" dirty="0">
+              <a:solidFill>
+                <a:schemeClr val="accent1">
+                  <a:lumMod val="90000"/>
+                  <a:lumOff val="10000"/>
+                </a:schemeClr>
+              </a:solidFill>
+              <a:effectLst>
+                <a:outerShdw blurRad="38100" dist="38100" dir="2700000" algn="tl">
+                  <a:srgbClr val="000000">
+                    <a:alpha val="43137"/>
+                  </a:srgbClr>
+                </a:outerShdw>
+              </a:effectLst>
+            </a:endParaRPr>
+          </a:p>
         </p:txBody>
       </p:sp>
       <p:sp>
@@ -4629,7 +4746,7 @@
         <p:spPr bwMode="auto">
           <a:xfrm>
             <a:off x="397042" y="5029200"/>
-            <a:ext cx="10591800" cy="15163800"/>
+            <a:ext cx="10591800" cy="15468600"/>
           </a:xfrm>
           <a:prstGeom prst="rect">
             <a:avLst/>
@@ -4663,7 +4780,7 @@
               </a:spcBef>
             </a:pPr>
             <a:r>
-              <a:rPr lang="en-GB" sz="3200" b="1" u="sng" dirty="0">
+              <a:rPr lang="en-GB" sz="4000" b="1" u="sng" dirty="0">
                 <a:solidFill>
                   <a:schemeClr val="tx2"/>
                 </a:solidFill>
@@ -4683,10 +4800,16 @@
               <a:rPr lang="en-US" sz="2000" b="1" dirty="0"/>
               <a:t> </a:t>
             </a:r>
-          </a:p>
-          <a:p>
-            <a:r>
-              <a:rPr lang="en-US" sz="2800" b="1" dirty="0">
+            <a:endParaRPr lang="en-US" sz="3200" b="1" dirty="0"/>
+          </a:p>
+          <a:p>
+            <a:pPr>
+              <a:spcBef>
+                <a:spcPts val="0"/>
+              </a:spcBef>
+            </a:pPr>
+            <a:r>
+              <a:rPr lang="en-US" sz="3200" b="1" u="sng" dirty="0">
                 <a:solidFill>
                   <a:schemeClr val="accent1">
                     <a:lumMod val="90000"/>
@@ -4705,20 +4828,40 @@
             </a:r>
           </a:p>
           <a:p>
+            <a:pPr>
+              <a:spcBef>
+                <a:spcPts val="0"/>
+              </a:spcBef>
+            </a:pPr>
             <a:endParaRPr lang="en-US" sz="2000" dirty="0"/>
           </a:p>
           <a:p>
-            <a:r>
-              <a:rPr lang="en-US" sz="2000" dirty="0"/>
+            <a:pPr>
+              <a:spcBef>
+                <a:spcPts val="0"/>
+              </a:spcBef>
+            </a:pPr>
+            <a:r>
+              <a:rPr lang="en-US" sz="2000" b="1" dirty="0"/>
               <a:t>Many busy parking lots are often plagued with congestion, with drivers competing to find a spot by cruising around and locating the right parking space. This is inefficient, time consuming where productivity is lost for consumers and businesses. The system we will be developing will address payment for parking, capacity management and location finding following an IoT approach using hardware and software. This project is focused on solving these issues by connecting consumers to parking lot owners and providing parking services by using a more convenient, simpler method to retrieve parking lot data seamlessly.</a:t>
             </a:r>
           </a:p>
           <a:p>
-            <a:endParaRPr lang="en-US" sz="2000" dirty="0"/>
-          </a:p>
-          <a:p>
-            <a:r>
-              <a:rPr lang="en-US" sz="2000" dirty="0"/>
+            <a:pPr>
+              <a:spcBef>
+                <a:spcPts val="0"/>
+              </a:spcBef>
+            </a:pPr>
+            <a:endParaRPr lang="en-US" sz="2000" b="1" dirty="0"/>
+          </a:p>
+          <a:p>
+            <a:pPr>
+              <a:spcBef>
+                <a:spcPts val="0"/>
+              </a:spcBef>
+            </a:pPr>
+            <a:r>
+              <a:rPr lang="en-US" sz="2000" b="1" dirty="0"/>
               <a:t>The main objective of this undertaking is to provide a more efficient and reliable platform to aid with parking scenarios. In particular, for the purpose of the consumer demographic who’s in the market for an alternative parking lot management system. Our focus was to develop a platform, that would be the gateway to support consumers with finding the best parking space during any time, any place or anywhere in the world.</a:t>
             </a:r>
           </a:p>
@@ -4741,7 +4884,7 @@
           </a:p>
           <a:p>
             <a:r>
-              <a:rPr lang="en-US" sz="2800" b="1" dirty="0">
+              <a:rPr lang="en-US" sz="3200" b="1" u="sng" dirty="0">
                 <a:solidFill>
                   <a:schemeClr val="accent1">
                     <a:lumMod val="90000"/>
@@ -4760,7 +4903,7 @@
             </a:r>
           </a:p>
           <a:p>
-            <a:endParaRPr lang="en-US" sz="3200" b="1" dirty="0">
+            <a:endParaRPr lang="en-US" sz="3200" b="1" u="sng" dirty="0">
               <a:solidFill>
                 <a:schemeClr val="accent1">
                   <a:lumMod val="90000"/>
@@ -4778,18 +4921,21 @@
           </a:p>
           <a:p>
             <a:r>
-              <a:rPr lang="en-US" sz="2000" dirty="0"/>
+              <a:rPr lang="en-US" sz="2000" b="1" dirty="0"/>
               <a:t>Through the development of this product, we wanted to reach as many demographics and be able to provide an inexpensive and reliable platform where parking lot information can be retrieved at a glance. The idea of this project came up when the group realized that we can develop an easier way to find parking spots, by connecting all the spots to a SMART parking application.</a:t>
             </a:r>
           </a:p>
           <a:p>
-            <a:r>
-              <a:rPr lang="en-US" sz="2000" dirty="0"/>
-              <a:t>We offer users with the ability to use a SMART parking mobile application to be able to add/manage cars, view parking lot data, make on-the go reservations for parking passes, accessible via an online database to send/receive information in real-time, all built-in with a simple and  effective interface. </a:t>
-            </a:r>
-          </a:p>
-          <a:p>
-            <a:endParaRPr lang="en-US" sz="3200" b="1" dirty="0">
+            <a:endParaRPr lang="en-US" sz="2000" b="1" dirty="0"/>
+          </a:p>
+          <a:p>
+            <a:r>
+              <a:rPr lang="en-US" sz="2000" b="1" dirty="0"/>
+              <a:t>We offer users with the ability to use a SMART parking mobile application to be able to add/manage cars, view parking lot data, make on-the go reservations for parking passes, accessible via an online database to send/receive information in real-time, all built-in with a simple and effective interface. </a:t>
+            </a:r>
+          </a:p>
+          <a:p>
+            <a:endParaRPr lang="en-US" sz="3200" b="1" u="sng" dirty="0">
               <a:solidFill>
                 <a:schemeClr val="accent1">
                   <a:lumMod val="90000"/>
@@ -4807,7 +4953,7 @@
           </a:p>
           <a:p>
             <a:r>
-              <a:rPr lang="en-US" sz="2800" b="1" dirty="0">
+              <a:rPr lang="en-US" sz="3200" b="1" u="sng" dirty="0">
                 <a:solidFill>
                   <a:schemeClr val="accent1">
                     <a:lumMod val="90000"/>
@@ -4826,18 +4972,48 @@
             </a:r>
           </a:p>
           <a:p>
-            <a:endParaRPr lang="en-US" sz="2000" dirty="0"/>
-          </a:p>
-          <a:p>
-            <a:r>
-              <a:rPr lang="en-US" sz="2000" dirty="0"/>
-              <a:t>In the industry today, there have many occurrences where parking in general has become a hassle for city residents and parking lot owners. This includes, situations where drivers are  struggling to find the best spot to park their vehicles. This can lead to dis-satisfying scenarios, where drivers are unaware of their surroundings, before even entering into the space. Due to this reason, it can lead to congestion in major traffic centric cities, with drivers competing to find a spot. </a:t>
-            </a:r>
-          </a:p>
-          <a:p>
-            <a:r>
-              <a:rPr lang="en-US" sz="2000" dirty="0"/>
-              <a:t>This can be time-consuming, inefficient where productivity is lost for consumers and businesses. This project is focused on helping reduce the impact of this cause, by developing a system that will address payment for parking by taking an advanced and modern approach towards capacity management, and real-time information gathering to keep consumers up to date with their daily occurrences.</a:t>
+            <a:endParaRPr lang="en-US" sz="3200" b="1" u="sng" dirty="0">
+              <a:solidFill>
+                <a:schemeClr val="accent1">
+                  <a:lumMod val="90000"/>
+                  <a:lumOff val="10000"/>
+                </a:schemeClr>
+              </a:solidFill>
+              <a:effectLst>
+                <a:outerShdw blurRad="38100" dist="38100" dir="2700000" algn="tl">
+                  <a:srgbClr val="000000">
+                    <a:alpha val="43137"/>
+                  </a:srgbClr>
+                </a:outerShdw>
+              </a:effectLst>
+            </a:endParaRPr>
+          </a:p>
+          <a:p>
+            <a:r>
+              <a:rPr lang="en-US" sz="2000" b="1" u="sng" dirty="0">
+                <a:solidFill>
+                  <a:schemeClr val="accent1">
+                    <a:lumMod val="90000"/>
+                    <a:lumOff val="10000"/>
+                  </a:schemeClr>
+                </a:solidFill>
+                <a:effectLst>
+                  <a:outerShdw blurRad="38100" dist="38100" dir="2700000" algn="tl">
+                    <a:srgbClr val="000000">
+                      <a:alpha val="43137"/>
+                    </a:srgbClr>
+                  </a:outerShdw>
+                </a:effectLst>
+              </a:rPr>
+              <a:t>I</a:t>
+            </a:r>
+            <a:r>
+              <a:rPr lang="en-US" sz="2000" b="1" dirty="0"/>
+              <a:t>n the industry today, there have many occurrences where parking in general has become a hassle for city residents and parking lot owners. Due to this reason, it can lead to congestion in major traffic centric cities, with drivers competing to find a spot. This can be time-consuming, inefficient where productivity is lost for consumers and businesses. This project is focused on helping reduce the impact of this cause, by developing a system that will address payment for parking, capacity management, real-time information gathering to keep consumers up to date with their daily occurrences</a:t>
+            </a:r>
+            <a:r>
+              <a:rPr lang="en-US" sz="2400" b="1" dirty="0"/>
+              <a:t>.</a:t>
             </a:r>
           </a:p>
           <a:p>
@@ -4933,7 +5109,7 @@
           </a:p>
           <a:p>
             <a:pPr marL="381000" indent="-381000"/>
-            <a:endParaRPr lang="en-US" sz="2800" b="1" dirty="0">
+            <a:endParaRPr lang="en-US" sz="2000" dirty="0">
               <a:solidFill>
                 <a:schemeClr val="accent1">
                   <a:lumMod val="90000"/>
@@ -4971,6 +5147,49 @@
             </a:r>
           </a:p>
           <a:p>
+            <a:endParaRPr lang="en-US" sz="4000" b="1" dirty="0">
+              <a:solidFill>
+                <a:srgbClr val="052754"/>
+              </a:solidFill>
+            </a:endParaRPr>
+          </a:p>
+          <a:p>
+            <a:pPr marL="381000" indent="-381000"/>
+            <a:endParaRPr lang="en-US" sz="2000" b="1" dirty="0">
+              <a:solidFill>
+                <a:schemeClr val="accent1">
+                  <a:lumMod val="90000"/>
+                  <a:lumOff val="10000"/>
+                </a:schemeClr>
+              </a:solidFill>
+              <a:effectLst>
+                <a:outerShdw blurRad="38100" dist="38100" dir="2700000" algn="tl">
+                  <a:srgbClr val="000000">
+                    <a:alpha val="43137"/>
+                  </a:srgbClr>
+                </a:outerShdw>
+              </a:effectLst>
+            </a:endParaRPr>
+          </a:p>
+          <a:p>
+            <a:pPr marL="381000" indent="-381000"/>
+            <a:endParaRPr lang="en-US" sz="2000" b="1" dirty="0">
+              <a:solidFill>
+                <a:schemeClr val="accent1">
+                  <a:lumMod val="90000"/>
+                  <a:lumOff val="10000"/>
+                </a:schemeClr>
+              </a:solidFill>
+              <a:effectLst>
+                <a:outerShdw blurRad="38100" dist="38100" dir="2700000" algn="tl">
+                  <a:srgbClr val="000000">
+                    <a:alpha val="43137"/>
+                  </a:srgbClr>
+                </a:outerShdw>
+              </a:effectLst>
+            </a:endParaRPr>
+          </a:p>
+          <a:p>
             <a:pPr marL="381000" indent="-381000"/>
             <a:endParaRPr lang="en-US" sz="3200" b="1" dirty="0">
               <a:solidFill>
@@ -4990,6 +5209,312 @@
           </a:p>
           <a:p>
             <a:pPr marL="381000" indent="-381000"/>
+            <a:endParaRPr lang="en-US" sz="3200" b="1" dirty="0">
+              <a:solidFill>
+                <a:schemeClr val="accent1">
+                  <a:lumMod val="90000"/>
+                  <a:lumOff val="10000"/>
+                </a:schemeClr>
+              </a:solidFill>
+              <a:effectLst>
+                <a:outerShdw blurRad="38100" dist="38100" dir="2700000" algn="tl">
+                  <a:srgbClr val="000000">
+                    <a:alpha val="43137"/>
+                  </a:srgbClr>
+                </a:outerShdw>
+              </a:effectLst>
+            </a:endParaRPr>
+          </a:p>
+          <a:p>
+            <a:pPr marL="381000" indent="-381000"/>
+            <a:endParaRPr lang="en-US" sz="3200" b="1" dirty="0">
+              <a:solidFill>
+                <a:schemeClr val="accent1">
+                  <a:lumMod val="90000"/>
+                  <a:lumOff val="10000"/>
+                </a:schemeClr>
+              </a:solidFill>
+              <a:effectLst>
+                <a:outerShdw blurRad="38100" dist="38100" dir="2700000" algn="tl">
+                  <a:srgbClr val="000000">
+                    <a:alpha val="43137"/>
+                  </a:srgbClr>
+                </a:outerShdw>
+              </a:effectLst>
+            </a:endParaRPr>
+          </a:p>
+          <a:p>
+            <a:pPr marL="381000" indent="-381000"/>
+            <a:endParaRPr lang="en-US" sz="3200" b="1" dirty="0">
+              <a:solidFill>
+                <a:schemeClr val="accent1">
+                  <a:lumMod val="90000"/>
+                  <a:lumOff val="10000"/>
+                </a:schemeClr>
+              </a:solidFill>
+              <a:effectLst>
+                <a:outerShdw blurRad="38100" dist="38100" dir="2700000" algn="tl">
+                  <a:srgbClr val="000000">
+                    <a:alpha val="43137"/>
+                  </a:srgbClr>
+                </a:outerShdw>
+              </a:effectLst>
+            </a:endParaRPr>
+          </a:p>
+          <a:p>
+            <a:pPr marL="381000" indent="-381000"/>
+            <a:endParaRPr lang="en-US" sz="3200" b="1" dirty="0">
+              <a:solidFill>
+                <a:schemeClr val="accent1">
+                  <a:lumMod val="90000"/>
+                  <a:lumOff val="10000"/>
+                </a:schemeClr>
+              </a:solidFill>
+              <a:effectLst>
+                <a:outerShdw blurRad="38100" dist="38100" dir="2700000" algn="tl">
+                  <a:srgbClr val="000000">
+                    <a:alpha val="43137"/>
+                  </a:srgbClr>
+                </a:outerShdw>
+              </a:effectLst>
+            </a:endParaRPr>
+          </a:p>
+          <a:p>
+            <a:pPr marL="381000" indent="-381000"/>
+            <a:endParaRPr lang="en-US" sz="3200" b="1" dirty="0">
+              <a:solidFill>
+                <a:schemeClr val="accent1">
+                  <a:lumMod val="90000"/>
+                  <a:lumOff val="10000"/>
+                </a:schemeClr>
+              </a:solidFill>
+              <a:effectLst>
+                <a:outerShdw blurRad="38100" dist="38100" dir="2700000" algn="tl">
+                  <a:srgbClr val="000000">
+                    <a:alpha val="43137"/>
+                  </a:srgbClr>
+                </a:outerShdw>
+              </a:effectLst>
+            </a:endParaRPr>
+          </a:p>
+          <a:p>
+            <a:pPr marL="381000" indent="-381000"/>
+            <a:endParaRPr lang="en-US" sz="3200" b="1" dirty="0">
+              <a:solidFill>
+                <a:schemeClr val="accent1">
+                  <a:lumMod val="90000"/>
+                  <a:lumOff val="10000"/>
+                </a:schemeClr>
+              </a:solidFill>
+              <a:effectLst>
+                <a:outerShdw blurRad="38100" dist="38100" dir="2700000" algn="tl">
+                  <a:srgbClr val="000000">
+                    <a:alpha val="43137"/>
+                  </a:srgbClr>
+                </a:outerShdw>
+              </a:effectLst>
+            </a:endParaRPr>
+          </a:p>
+          <a:p>
+            <a:pPr marL="381000" indent="-381000"/>
+            <a:endParaRPr lang="en-US" sz="3200" b="1" dirty="0">
+              <a:solidFill>
+                <a:schemeClr val="accent1">
+                  <a:lumMod val="90000"/>
+                  <a:lumOff val="10000"/>
+                </a:schemeClr>
+              </a:solidFill>
+              <a:effectLst>
+                <a:outerShdw blurRad="38100" dist="38100" dir="2700000" algn="tl">
+                  <a:srgbClr val="000000">
+                    <a:alpha val="43137"/>
+                  </a:srgbClr>
+                </a:outerShdw>
+              </a:effectLst>
+            </a:endParaRPr>
+          </a:p>
+          <a:p>
+            <a:pPr marL="381000" indent="-381000"/>
+            <a:endParaRPr lang="en-US" sz="3200" b="1" dirty="0">
+              <a:solidFill>
+                <a:schemeClr val="accent1">
+                  <a:lumMod val="90000"/>
+                  <a:lumOff val="10000"/>
+                </a:schemeClr>
+              </a:solidFill>
+              <a:effectLst>
+                <a:outerShdw blurRad="38100" dist="38100" dir="2700000" algn="tl">
+                  <a:srgbClr val="000000">
+                    <a:alpha val="43137"/>
+                  </a:srgbClr>
+                </a:outerShdw>
+              </a:effectLst>
+            </a:endParaRPr>
+          </a:p>
+          <a:p>
+            <a:pPr marL="381000" indent="-381000"/>
+            <a:endParaRPr lang="en-US" sz="3200" b="1" dirty="0">
+              <a:solidFill>
+                <a:schemeClr val="accent1">
+                  <a:lumMod val="90000"/>
+                  <a:lumOff val="10000"/>
+                </a:schemeClr>
+              </a:solidFill>
+              <a:effectLst>
+                <a:outerShdw blurRad="38100" dist="38100" dir="2700000" algn="tl">
+                  <a:srgbClr val="000000">
+                    <a:alpha val="43137"/>
+                  </a:srgbClr>
+                </a:outerShdw>
+              </a:effectLst>
+            </a:endParaRPr>
+          </a:p>
+          <a:p>
+            <a:pPr marL="381000" indent="-381000"/>
+            <a:endParaRPr lang="en-US" sz="3200" b="1" dirty="0">
+              <a:solidFill>
+                <a:schemeClr val="accent1">
+                  <a:lumMod val="90000"/>
+                  <a:lumOff val="10000"/>
+                </a:schemeClr>
+              </a:solidFill>
+              <a:effectLst>
+                <a:outerShdw blurRad="38100" dist="38100" dir="2700000" algn="tl">
+                  <a:srgbClr val="000000">
+                    <a:alpha val="43137"/>
+                  </a:srgbClr>
+                </a:outerShdw>
+              </a:effectLst>
+            </a:endParaRPr>
+          </a:p>
+          <a:p>
+            <a:pPr marL="381000" indent="-381000"/>
+            <a:endParaRPr lang="en-US" sz="3200" b="1" dirty="0">
+              <a:solidFill>
+                <a:schemeClr val="accent1">
+                  <a:lumMod val="90000"/>
+                  <a:lumOff val="10000"/>
+                </a:schemeClr>
+              </a:solidFill>
+              <a:effectLst>
+                <a:outerShdw blurRad="38100" dist="38100" dir="2700000" algn="tl">
+                  <a:srgbClr val="000000">
+                    <a:alpha val="43137"/>
+                  </a:srgbClr>
+                </a:outerShdw>
+              </a:effectLst>
+            </a:endParaRPr>
+          </a:p>
+          <a:p>
+            <a:pPr marL="381000" indent="-381000"/>
+            <a:endParaRPr lang="en-US" sz="3200" b="1" dirty="0">
+              <a:solidFill>
+                <a:schemeClr val="accent1">
+                  <a:lumMod val="90000"/>
+                  <a:lumOff val="10000"/>
+                </a:schemeClr>
+              </a:solidFill>
+              <a:effectLst>
+                <a:outerShdw blurRad="38100" dist="38100" dir="2700000" algn="tl">
+                  <a:srgbClr val="000000">
+                    <a:alpha val="43137"/>
+                  </a:srgbClr>
+                </a:outerShdw>
+              </a:effectLst>
+            </a:endParaRPr>
+          </a:p>
+          <a:p>
+            <a:pPr marL="381000" indent="-381000"/>
+            <a:endParaRPr lang="en-US" sz="3200" b="1" dirty="0">
+              <a:solidFill>
+                <a:schemeClr val="accent1">
+                  <a:lumMod val="90000"/>
+                  <a:lumOff val="10000"/>
+                </a:schemeClr>
+              </a:solidFill>
+              <a:effectLst>
+                <a:outerShdw blurRad="38100" dist="38100" dir="2700000" algn="tl">
+                  <a:srgbClr val="000000">
+                    <a:alpha val="43137"/>
+                  </a:srgbClr>
+                </a:outerShdw>
+              </a:effectLst>
+            </a:endParaRPr>
+          </a:p>
+          <a:p>
+            <a:pPr marL="381000" indent="-381000"/>
+            <a:endParaRPr lang="en-US" sz="3200" b="1" dirty="0">
+              <a:solidFill>
+                <a:schemeClr val="accent1">
+                  <a:lumMod val="90000"/>
+                  <a:lumOff val="10000"/>
+                </a:schemeClr>
+              </a:solidFill>
+              <a:effectLst>
+                <a:outerShdw blurRad="38100" dist="38100" dir="2700000" algn="tl">
+                  <a:srgbClr val="000000">
+                    <a:alpha val="43137"/>
+                  </a:srgbClr>
+                </a:outerShdw>
+              </a:effectLst>
+            </a:endParaRPr>
+          </a:p>
+          <a:p>
+            <a:pPr marL="381000" indent="-381000"/>
+            <a:endParaRPr lang="en-US" sz="3200" b="1" dirty="0">
+              <a:solidFill>
+                <a:schemeClr val="accent1">
+                  <a:lumMod val="90000"/>
+                  <a:lumOff val="10000"/>
+                </a:schemeClr>
+              </a:solidFill>
+              <a:effectLst>
+                <a:outerShdw blurRad="38100" dist="38100" dir="2700000" algn="tl">
+                  <a:srgbClr val="000000">
+                    <a:alpha val="43137"/>
+                  </a:srgbClr>
+                </a:outerShdw>
+              </a:effectLst>
+            </a:endParaRPr>
+          </a:p>
+          <a:p>
+            <a:pPr marL="381000" indent="-381000"/>
+            <a:endParaRPr lang="en-US" sz="3200" b="1" dirty="0">
+              <a:solidFill>
+                <a:schemeClr val="accent1">
+                  <a:lumMod val="90000"/>
+                  <a:lumOff val="10000"/>
+                </a:schemeClr>
+              </a:solidFill>
+              <a:effectLst>
+                <a:outerShdw blurRad="38100" dist="38100" dir="2700000" algn="tl">
+                  <a:srgbClr val="000000">
+                    <a:alpha val="43137"/>
+                  </a:srgbClr>
+                </a:outerShdw>
+              </a:effectLst>
+            </a:endParaRPr>
+          </a:p>
+          <a:p>
+            <a:pPr marL="381000" indent="-381000"/>
+            <a:endParaRPr lang="en-US" sz="3200" b="1" dirty="0">
+              <a:solidFill>
+                <a:schemeClr val="accent1">
+                  <a:lumMod val="90000"/>
+                  <a:lumOff val="10000"/>
+                </a:schemeClr>
+              </a:solidFill>
+              <a:effectLst>
+                <a:outerShdw blurRad="38100" dist="38100" dir="2700000" algn="tl">
+                  <a:srgbClr val="000000">
+                    <a:alpha val="43137"/>
+                  </a:srgbClr>
+                </a:outerShdw>
+              </a:effectLst>
+            </a:endParaRPr>
+          </a:p>
+          <a:p>
+            <a:pPr marL="381000" indent="-381000"/>
             <a:r>
               <a:rPr lang="en-US" sz="3200" b="1" dirty="0">
                 <a:solidFill>
@@ -5011,7 +5536,7 @@
           </a:p>
           <a:p>
             <a:pPr marL="381000" indent="-381000"/>
-            <a:endParaRPr lang="en-US" sz="3200" b="1" dirty="0">
+            <a:endParaRPr lang="en-US" sz="2000" b="1" dirty="0">
               <a:solidFill>
                 <a:schemeClr val="accent1">
                   <a:lumMod val="90000"/>
@@ -5120,26 +5645,13 @@
             </a:endParaRPr>
           </a:p>
           <a:p>
-            <a:endParaRPr lang="en-US" sz="2800" dirty="0">
-              <a:effectLst>
-                <a:outerShdw blurRad="38100" dist="38100" dir="2700000" algn="tl">
-                  <a:srgbClr val="000000">
-                    <a:alpha val="43137"/>
-                  </a:srgbClr>
-                </a:outerShdw>
-              </a:effectLst>
-              <a:latin typeface="Georgia" charset="0"/>
-              <a:cs typeface="Georgia" charset="0"/>
-            </a:endParaRPr>
-          </a:p>
-          <a:p>
             <a:pPr>
               <a:spcBef>
                 <a:spcPct val="50000"/>
               </a:spcBef>
             </a:pPr>
             <a:r>
-              <a:rPr lang="en-US" sz="3200" b="1" dirty="0">
+              <a:rPr lang="en-US" sz="3200" b="1" u="sng" dirty="0">
                 <a:solidFill>
                   <a:schemeClr val="accent1">
                     <a:lumMod val="90000"/>
@@ -5163,6 +5675,54 @@
                 <a:spcPct val="50000"/>
               </a:spcBef>
             </a:pPr>
+            <a:endParaRPr lang="en-US" sz="2000" b="1" dirty="0"/>
+          </a:p>
+          <a:p>
+            <a:pPr>
+              <a:spcBef>
+                <a:spcPct val="50000"/>
+              </a:spcBef>
+            </a:pPr>
+            <a:endParaRPr lang="en-US" sz="2000" b="1" dirty="0"/>
+          </a:p>
+          <a:p>
+            <a:pPr>
+              <a:spcBef>
+                <a:spcPct val="50000"/>
+              </a:spcBef>
+            </a:pPr>
+            <a:endParaRPr lang="en-US" sz="2000" b="1" dirty="0"/>
+          </a:p>
+          <a:p>
+            <a:pPr>
+              <a:spcBef>
+                <a:spcPct val="50000"/>
+              </a:spcBef>
+            </a:pPr>
+            <a:endParaRPr lang="en-US" sz="2000" b="1" dirty="0"/>
+          </a:p>
+          <a:p>
+            <a:pPr>
+              <a:spcBef>
+                <a:spcPct val="50000"/>
+              </a:spcBef>
+            </a:pPr>
+            <a:endParaRPr lang="en-US" sz="2000" b="1" dirty="0"/>
+          </a:p>
+          <a:p>
+            <a:pPr>
+              <a:spcBef>
+                <a:spcPct val="50000"/>
+              </a:spcBef>
+            </a:pPr>
+            <a:endParaRPr lang="en-US" sz="2000" b="1" dirty="0"/>
+          </a:p>
+          <a:p>
+            <a:pPr>
+              <a:spcBef>
+                <a:spcPct val="50000"/>
+              </a:spcBef>
+            </a:pPr>
             <a:endParaRPr lang="en-US" sz="3200" b="1" dirty="0">
               <a:solidFill>
                 <a:schemeClr val="accent1">
@@ -5185,8 +5745,184 @@
                 <a:spcPct val="50000"/>
               </a:spcBef>
             </a:pPr>
-            <a:r>
-              <a:rPr lang="en-US" sz="3200" b="1" dirty="0">
+            <a:endParaRPr lang="en-US" sz="3200" b="1" dirty="0">
+              <a:solidFill>
+                <a:schemeClr val="accent1">
+                  <a:lumMod val="90000"/>
+                  <a:lumOff val="10000"/>
+                </a:schemeClr>
+              </a:solidFill>
+              <a:effectLst>
+                <a:outerShdw blurRad="38100" dist="38100" dir="2700000" algn="tl">
+                  <a:srgbClr val="000000">
+                    <a:alpha val="43137"/>
+                  </a:srgbClr>
+                </a:outerShdw>
+              </a:effectLst>
+            </a:endParaRPr>
+          </a:p>
+          <a:p>
+            <a:pPr>
+              <a:spcBef>
+                <a:spcPct val="50000"/>
+              </a:spcBef>
+            </a:pPr>
+            <a:endParaRPr lang="en-US" sz="3200" b="1" u="sng" dirty="0">
+              <a:solidFill>
+                <a:schemeClr val="accent1">
+                  <a:lumMod val="90000"/>
+                  <a:lumOff val="10000"/>
+                </a:schemeClr>
+              </a:solidFill>
+              <a:effectLst>
+                <a:outerShdw blurRad="38100" dist="38100" dir="2700000" algn="tl">
+                  <a:srgbClr val="000000">
+                    <a:alpha val="43137"/>
+                  </a:srgbClr>
+                </a:outerShdw>
+              </a:effectLst>
+            </a:endParaRPr>
+          </a:p>
+          <a:p>
+            <a:pPr>
+              <a:spcBef>
+                <a:spcPct val="50000"/>
+              </a:spcBef>
+            </a:pPr>
+            <a:endParaRPr lang="en-US" sz="3200" b="1" u="sng" dirty="0">
+              <a:solidFill>
+                <a:schemeClr val="accent1">
+                  <a:lumMod val="90000"/>
+                  <a:lumOff val="10000"/>
+                </a:schemeClr>
+              </a:solidFill>
+              <a:effectLst>
+                <a:outerShdw blurRad="38100" dist="38100" dir="2700000" algn="tl">
+                  <a:srgbClr val="000000">
+                    <a:alpha val="43137"/>
+                  </a:srgbClr>
+                </a:outerShdw>
+              </a:effectLst>
+            </a:endParaRPr>
+          </a:p>
+          <a:p>
+            <a:pPr>
+              <a:spcBef>
+                <a:spcPct val="50000"/>
+              </a:spcBef>
+            </a:pPr>
+            <a:endParaRPr lang="en-US" sz="3200" b="1" u="sng" dirty="0">
+              <a:solidFill>
+                <a:schemeClr val="accent1">
+                  <a:lumMod val="90000"/>
+                  <a:lumOff val="10000"/>
+                </a:schemeClr>
+              </a:solidFill>
+              <a:effectLst>
+                <a:outerShdw blurRad="38100" dist="38100" dir="2700000" algn="tl">
+                  <a:srgbClr val="000000">
+                    <a:alpha val="43137"/>
+                  </a:srgbClr>
+                </a:outerShdw>
+              </a:effectLst>
+            </a:endParaRPr>
+          </a:p>
+          <a:p>
+            <a:pPr>
+              <a:spcBef>
+                <a:spcPct val="50000"/>
+              </a:spcBef>
+            </a:pPr>
+            <a:endParaRPr lang="en-US" sz="3200" b="1" u="sng" dirty="0">
+              <a:solidFill>
+                <a:schemeClr val="accent1">
+                  <a:lumMod val="90000"/>
+                  <a:lumOff val="10000"/>
+                </a:schemeClr>
+              </a:solidFill>
+              <a:effectLst>
+                <a:outerShdw blurRad="38100" dist="38100" dir="2700000" algn="tl">
+                  <a:srgbClr val="000000">
+                    <a:alpha val="43137"/>
+                  </a:srgbClr>
+                </a:outerShdw>
+              </a:effectLst>
+            </a:endParaRPr>
+          </a:p>
+          <a:p>
+            <a:pPr>
+              <a:spcBef>
+                <a:spcPct val="50000"/>
+              </a:spcBef>
+            </a:pPr>
+            <a:endParaRPr lang="en-US" sz="3200" b="1" u="sng" dirty="0">
+              <a:solidFill>
+                <a:schemeClr val="accent1">
+                  <a:lumMod val="90000"/>
+                  <a:lumOff val="10000"/>
+                </a:schemeClr>
+              </a:solidFill>
+              <a:effectLst>
+                <a:outerShdw blurRad="38100" dist="38100" dir="2700000" algn="tl">
+                  <a:srgbClr val="000000">
+                    <a:alpha val="43137"/>
+                  </a:srgbClr>
+                </a:outerShdw>
+              </a:effectLst>
+            </a:endParaRPr>
+          </a:p>
+          <a:p>
+            <a:pPr>
+              <a:spcBef>
+                <a:spcPct val="50000"/>
+              </a:spcBef>
+            </a:pPr>
+            <a:endParaRPr lang="en-US" sz="3200" b="1" u="sng" dirty="0">
+              <a:solidFill>
+                <a:schemeClr val="accent1">
+                  <a:lumMod val="90000"/>
+                  <a:lumOff val="10000"/>
+                </a:schemeClr>
+              </a:solidFill>
+              <a:effectLst>
+                <a:outerShdw blurRad="38100" dist="38100" dir="2700000" algn="tl">
+                  <a:srgbClr val="000000">
+                    <a:alpha val="43137"/>
+                  </a:srgbClr>
+                </a:outerShdw>
+              </a:effectLst>
+            </a:endParaRPr>
+          </a:p>
+          <a:p>
+            <a:pPr>
+              <a:spcBef>
+                <a:spcPct val="50000"/>
+              </a:spcBef>
+            </a:pPr>
+            <a:endParaRPr lang="en-US" sz="3200" b="1" u="sng" dirty="0">
+              <a:solidFill>
+                <a:schemeClr val="accent1">
+                  <a:lumMod val="90000"/>
+                  <a:lumOff val="10000"/>
+                </a:schemeClr>
+              </a:solidFill>
+              <a:effectLst>
+                <a:outerShdw blurRad="38100" dist="38100" dir="2700000" algn="tl">
+                  <a:srgbClr val="000000">
+                    <a:alpha val="43137"/>
+                  </a:srgbClr>
+                </a:outerShdw>
+              </a:effectLst>
+            </a:endParaRPr>
+          </a:p>
+          <a:p>
+            <a:pPr>
+              <a:spcBef>
+                <a:spcPct val="50000"/>
+              </a:spcBef>
+            </a:pPr>
+            <a:r>
+              <a:rPr lang="en-US" sz="3200" b="1" u="sng" dirty="0">
                 <a:solidFill>
                   <a:schemeClr val="accent1">
                     <a:lumMod val="90000"/>
@@ -5201,8 +5937,307 @@
                   </a:outerShdw>
                 </a:effectLst>
               </a:rPr>
-              <a:t>Database:</a:t>
-            </a:r>
+              <a:t>Database Configuration:</a:t>
+            </a:r>
+          </a:p>
+          <a:p>
+            <a:pPr>
+              <a:spcBef>
+                <a:spcPct val="50000"/>
+              </a:spcBef>
+            </a:pPr>
+            <a:endParaRPr lang="en-US" sz="2000" b="1" dirty="0">
+              <a:solidFill>
+                <a:schemeClr val="accent1">
+                  <a:lumMod val="90000"/>
+                  <a:lumOff val="10000"/>
+                </a:schemeClr>
+              </a:solidFill>
+            </a:endParaRPr>
+          </a:p>
+          <a:p>
+            <a:endParaRPr lang="en-US" sz="2000" b="1" dirty="0"/>
+          </a:p>
+          <a:p>
+            <a:endParaRPr lang="en-US" sz="2000" b="1" dirty="0"/>
+          </a:p>
+          <a:p>
+            <a:endParaRPr lang="en-US" sz="2000" b="1" dirty="0"/>
+          </a:p>
+          <a:p>
+            <a:endParaRPr lang="en-US" sz="2000" b="1" dirty="0"/>
+          </a:p>
+          <a:p>
+            <a:endParaRPr lang="en-US" sz="2000" b="1" dirty="0"/>
+          </a:p>
+          <a:p>
+            <a:endParaRPr lang="en-US" sz="2000" b="1" dirty="0"/>
+          </a:p>
+          <a:p>
+            <a:endParaRPr lang="en-US" sz="2000" b="1" dirty="0"/>
+          </a:p>
+          <a:p>
+            <a:endParaRPr lang="en-US" sz="2000" b="1" dirty="0"/>
+          </a:p>
+          <a:p>
+            <a:endParaRPr lang="en-US" sz="2000" b="1" dirty="0"/>
+          </a:p>
+          <a:p>
+            <a:endParaRPr lang="en-US" sz="2000" b="1" dirty="0"/>
+          </a:p>
+          <a:p>
+            <a:endParaRPr lang="en-US" sz="2000" b="1" dirty="0"/>
+          </a:p>
+          <a:p>
+            <a:endParaRPr lang="en-US" sz="2000" b="1" dirty="0"/>
+          </a:p>
+          <a:p>
+            <a:endParaRPr lang="en-US" sz="2000" b="1" dirty="0"/>
+          </a:p>
+          <a:p>
+            <a:endParaRPr lang="en-US" sz="2000" b="1" dirty="0"/>
+          </a:p>
+          <a:p>
+            <a:endParaRPr lang="en-US" sz="2000" b="1" dirty="0"/>
+          </a:p>
+          <a:p>
+            <a:endParaRPr lang="en-US" sz="2000" b="1" dirty="0"/>
+          </a:p>
+          <a:p>
+            <a:endParaRPr lang="en-US" sz="2000" b="1" dirty="0"/>
+          </a:p>
+          <a:p>
+            <a:endParaRPr lang="en-US" sz="2800" b="1" dirty="0">
+              <a:solidFill>
+                <a:srgbClr val="052754"/>
+              </a:solidFill>
+            </a:endParaRPr>
+          </a:p>
+          <a:p>
+            <a:endParaRPr lang="en-US" sz="3200" b="1" dirty="0">
+              <a:solidFill>
+                <a:srgbClr val="052754"/>
+              </a:solidFill>
+            </a:endParaRPr>
+          </a:p>
+          <a:p>
+            <a:endParaRPr lang="en-US" sz="2000" b="1" dirty="0"/>
+          </a:p>
+          <a:p>
+            <a:pPr>
+              <a:spcBef>
+                <a:spcPct val="50000"/>
+              </a:spcBef>
+            </a:pPr>
+            <a:endParaRPr lang="en-US" sz="2000" b="1" dirty="0"/>
+          </a:p>
+          <a:p>
+            <a:pPr>
+              <a:spcBef>
+                <a:spcPct val="50000"/>
+              </a:spcBef>
+            </a:pPr>
+            <a:r>
+              <a:rPr lang="en-US" sz="2000" b="1" dirty="0"/>
+              <a:t>The ‘</a:t>
+            </a:r>
+            <a:r>
+              <a:rPr lang="en-US" sz="2000" b="1" dirty="0" err="1"/>
+              <a:t>ProximityData</a:t>
+            </a:r>
+            <a:r>
+              <a:rPr lang="en-US" sz="2000" b="1" dirty="0"/>
+              <a:t>’ structure stores raw proximity values sent from the VCNL4010 hardware device, and is retrieved by the mobile application to display the real-time proximity levels of the lot. ‘Cars’ table stores each registered vehicle attributes and a license plate number to identify the user.</a:t>
+            </a:r>
+          </a:p>
+          <a:p>
+            <a:pPr>
+              <a:spcBef>
+                <a:spcPct val="50000"/>
+              </a:spcBef>
+            </a:pPr>
+            <a:endParaRPr lang="en-US" sz="2000" b="1" dirty="0"/>
+          </a:p>
+          <a:p>
+            <a:pPr>
+              <a:spcBef>
+                <a:spcPct val="50000"/>
+              </a:spcBef>
+            </a:pPr>
+            <a:endParaRPr lang="en-US" sz="2000" b="1" dirty="0"/>
+          </a:p>
+          <a:p>
+            <a:pPr>
+              <a:spcBef>
+                <a:spcPct val="50000"/>
+              </a:spcBef>
+            </a:pPr>
+            <a:endParaRPr lang="en-US" sz="2000" b="1" dirty="0"/>
+          </a:p>
+          <a:p>
+            <a:pPr>
+              <a:spcBef>
+                <a:spcPct val="50000"/>
+              </a:spcBef>
+            </a:pPr>
+            <a:endParaRPr lang="en-US" sz="2000" b="1" dirty="0"/>
+          </a:p>
+          <a:p>
+            <a:pPr>
+              <a:spcBef>
+                <a:spcPct val="50000"/>
+              </a:spcBef>
+            </a:pPr>
+            <a:endParaRPr lang="en-US" sz="2000" b="1" dirty="0"/>
+          </a:p>
+          <a:p>
+            <a:pPr>
+              <a:spcBef>
+                <a:spcPct val="50000"/>
+              </a:spcBef>
+            </a:pPr>
+            <a:endParaRPr lang="en-US" sz="2000" b="1" dirty="0"/>
+          </a:p>
+          <a:p>
+            <a:pPr>
+              <a:spcBef>
+                <a:spcPct val="50000"/>
+              </a:spcBef>
+            </a:pPr>
+            <a:r>
+              <a:rPr lang="en-US" sz="2000" b="1" dirty="0"/>
+              <a:t>‘Orders’ table stores the payment processing details of the user using a OID(foreign key) to identify the order. The ‘</a:t>
+            </a:r>
+            <a:r>
+              <a:rPr lang="en-US" sz="2000" b="1" dirty="0" err="1"/>
+              <a:t>GateStatus</a:t>
+            </a:r>
+            <a:r>
+              <a:rPr lang="en-US" sz="2000" b="1" dirty="0"/>
+              <a:t>’ table stores IR Break Beam entry/exit status and a timestamp to indicate the exact time an action is performed. The ‘</a:t>
+            </a:r>
+            <a:r>
+              <a:rPr lang="en-US" sz="2000" b="1" dirty="0" err="1"/>
+              <a:t>EntryStatus</a:t>
+            </a:r>
+            <a:r>
+              <a:rPr lang="en-US" sz="2000" b="1" dirty="0"/>
+              <a:t>’ table stores a value of 0 each time the lot is full to track the overall status. The ‘</a:t>
+            </a:r>
+            <a:r>
+              <a:rPr lang="en-US" sz="2000" b="1" dirty="0" err="1"/>
+              <a:t>ParkingLocations</a:t>
+            </a:r>
+            <a:r>
+              <a:rPr lang="en-US" sz="2000" b="1" dirty="0"/>
+              <a:t>’ table stores parking lot details under the specific UID of the current user.</a:t>
+            </a:r>
+          </a:p>
+          <a:p>
+            <a:pPr>
+              <a:spcBef>
+                <a:spcPct val="50000"/>
+              </a:spcBef>
+            </a:pPr>
+            <a:endParaRPr lang="en-US" sz="2000" b="1" dirty="0"/>
+          </a:p>
+          <a:p>
+            <a:pPr>
+              <a:spcBef>
+                <a:spcPct val="50000"/>
+              </a:spcBef>
+            </a:pPr>
+            <a:r>
+              <a:rPr lang="en-US" sz="2000" dirty="0"/>
+              <a:t>                                     </a:t>
+            </a:r>
+            <a:endParaRPr lang="en-US" sz="2000" b="1" dirty="0"/>
+          </a:p>
+          <a:p>
+            <a:pPr>
+              <a:spcBef>
+                <a:spcPct val="50000"/>
+              </a:spcBef>
+            </a:pPr>
+            <a:endParaRPr lang="en-US" sz="2000" b="1" dirty="0"/>
+          </a:p>
+          <a:p>
+            <a:pPr>
+              <a:spcBef>
+                <a:spcPct val="50000"/>
+              </a:spcBef>
+            </a:pPr>
+            <a:endParaRPr lang="en-US" sz="2000" b="1" dirty="0"/>
+          </a:p>
+          <a:p>
+            <a:pPr>
+              <a:spcBef>
+                <a:spcPct val="50000"/>
+              </a:spcBef>
+            </a:pPr>
+            <a:endParaRPr lang="en-US" sz="2000" b="1" dirty="0"/>
+          </a:p>
+          <a:p>
+            <a:pPr>
+              <a:spcBef>
+                <a:spcPct val="50000"/>
+              </a:spcBef>
+            </a:pPr>
+            <a:endParaRPr lang="en-US" sz="2000" b="1" dirty="0"/>
+          </a:p>
+          <a:p>
+            <a:pPr>
+              <a:spcBef>
+                <a:spcPct val="50000"/>
+              </a:spcBef>
+            </a:pPr>
+            <a:endParaRPr lang="en-US" sz="2000" b="1" dirty="0"/>
+          </a:p>
+          <a:p>
+            <a:pPr>
+              <a:spcBef>
+                <a:spcPct val="50000"/>
+              </a:spcBef>
+            </a:pPr>
+            <a:endParaRPr lang="en-US" sz="2000" b="1" dirty="0"/>
+          </a:p>
+          <a:p>
+            <a:pPr>
+              <a:spcBef>
+                <a:spcPct val="50000"/>
+              </a:spcBef>
+            </a:pPr>
+            <a:endParaRPr lang="en-US" sz="2000" b="1" dirty="0"/>
+          </a:p>
+          <a:p>
+            <a:pPr>
+              <a:spcBef>
+                <a:spcPct val="50000"/>
+              </a:spcBef>
+            </a:pPr>
+            <a:endParaRPr lang="en-US" sz="2000" dirty="0"/>
+          </a:p>
+          <a:p>
+            <a:pPr>
+              <a:spcBef>
+                <a:spcPct val="50000"/>
+              </a:spcBef>
+            </a:pPr>
+            <a:endParaRPr lang="en-US" sz="3200" b="1" dirty="0">
+              <a:solidFill>
+                <a:schemeClr val="accent1">
+                  <a:lumMod val="90000"/>
+                  <a:lumOff val="10000"/>
+                </a:schemeClr>
+              </a:solidFill>
+              <a:effectLst>
+                <a:outerShdw blurRad="38100" dist="38100" dir="2700000" algn="tl">
+                  <a:srgbClr val="000000">
+                    <a:alpha val="43137"/>
+                  </a:srgbClr>
+                </a:outerShdw>
+              </a:effectLst>
+            </a:endParaRPr>
           </a:p>
         </p:txBody>
       </p:sp>
@@ -5348,7 +6383,7 @@
                   </a:outerShdw>
                 </a:effectLst>
               </a:rPr>
-              <a:t>Unit Testing:</a:t>
+              <a:t>Unit Testing:(not set)</a:t>
             </a:r>
           </a:p>
           <a:p>
@@ -5405,8 +6440,44 @@
               <a:t>Production Testing</a:t>
             </a:r>
             <a:r>
-              <a:rPr lang="en-US" sz="2800" b="1" dirty="0"/>
-              <a:t>:</a:t>
+              <a:rPr lang="en-US" sz="3200" b="1" dirty="0"/>
+              <a:t>: </a:t>
+            </a:r>
+            <a:r>
+              <a:rPr lang="en-US" sz="3200" b="1" dirty="0">
+                <a:solidFill>
+                  <a:schemeClr val="accent1">
+                    <a:lumMod val="90000"/>
+                    <a:lumOff val="10000"/>
+                  </a:schemeClr>
+                </a:solidFill>
+                <a:effectLst>
+                  <a:outerShdw blurRad="38100" dist="38100" dir="2700000" algn="tl">
+                    <a:srgbClr val="000000">
+                      <a:alpha val="43137"/>
+                    </a:srgbClr>
+                  </a:outerShdw>
+                </a:effectLst>
+              </a:rPr>
+              <a:t>(not set</a:t>
+            </a:r>
+            <a:r>
+              <a:rPr lang="en-US" sz="2800" b="1" dirty="0">
+                <a:solidFill>
+                  <a:schemeClr val="accent1">
+                    <a:lumMod val="90000"/>
+                    <a:lumOff val="10000"/>
+                  </a:schemeClr>
+                </a:solidFill>
+                <a:effectLst>
+                  <a:outerShdw blurRad="38100" dist="38100" dir="2700000" algn="tl">
+                    <a:srgbClr val="000000">
+                      <a:alpha val="43137"/>
+                    </a:srgbClr>
+                  </a:outerShdw>
+                </a:effectLst>
+              </a:rPr>
+              <a:t>)</a:t>
             </a:r>
           </a:p>
           <a:p>
@@ -5522,709 +6593,1335 @@
           </a:p>
         </p:txBody>
       </p:sp>
+      <p:pic>
+        <p:nvPicPr>
+          <p:cNvPr id="3" name="Picture 2">
+            <a:extLst>
+              <a:ext uri="{FF2B5EF4-FFF2-40B4-BE49-F238E27FC236}">
+                <a16:creationId xmlns:a16="http://schemas.microsoft.com/office/drawing/2014/main" id="{8D53D329-EEE4-47B8-9C5C-DC5A35CDAB52}"/>
+              </a:ext>
+            </a:extLst>
+          </p:cNvPr>
+          <p:cNvPicPr>
+            <a:picLocks noChangeAspect="1"/>
+          </p:cNvPicPr>
+          <p:nvPr/>
+        </p:nvPicPr>
+        <p:blipFill>
+          <a:blip r:embed="rId2"/>
+          <a:stretch>
+            <a:fillRect/>
+          </a:stretch>
+        </p:blipFill>
+        <p:spPr>
+          <a:xfrm>
+            <a:off x="2027895" y="22707536"/>
+            <a:ext cx="7296116" cy="3200527"/>
+          </a:xfrm>
+          <a:prstGeom prst="rect">
+            <a:avLst/>
+          </a:prstGeom>
+        </p:spPr>
+      </p:pic>
       <p:sp>
         <p:nvSpPr>
-          <p:cNvPr id="14347" name="Rectangle 13"/>
-          <p:cNvSpPr>
-            <a:spLocks noChangeArrowheads="1"/>
-          </p:cNvSpPr>
+          <p:cNvPr id="4" name="TextBox 3">
+            <a:extLst>
+              <a:ext uri="{FF2B5EF4-FFF2-40B4-BE49-F238E27FC236}">
+                <a16:creationId xmlns:a16="http://schemas.microsoft.com/office/drawing/2014/main" id="{8100F3AB-B007-49B4-8264-57DA612CF7EB}"/>
+              </a:ext>
+            </a:extLst>
+          </p:cNvPr>
+          <p:cNvSpPr txBox="1"/>
           <p:nvPr/>
         </p:nvSpPr>
+        <p:spPr>
+          <a:xfrm>
+            <a:off x="3761896" y="26134430"/>
+            <a:ext cx="4281633" cy="461665"/>
+          </a:xfrm>
+          <a:prstGeom prst="rect">
+            <a:avLst/>
+          </a:prstGeom>
+          <a:noFill/>
+        </p:spPr>
+        <p:txBody>
+          <a:bodyPr wrap="square" rtlCol="0">
+            <a:spAutoFit/>
+          </a:bodyPr>
+          <a:lstStyle/>
+          <a:p>
+            <a:r>
+              <a:rPr lang="en-US" sz="2400" b="1" i="1" dirty="0">
+                <a:latin typeface="Times New Roman" panose="02020603050405020304" pitchFamily="18" charset="0"/>
+                <a:cs typeface="Times New Roman" panose="02020603050405020304" pitchFamily="18" charset="0"/>
+              </a:rPr>
+              <a:t>BOM – Final Project Budget</a:t>
+            </a:r>
+          </a:p>
+        </p:txBody>
+      </p:sp>
+      <p:pic>
+        <p:nvPicPr>
+          <p:cNvPr id="31" name="Picture 30">
+            <a:extLst>
+              <a:ext uri="{FF2B5EF4-FFF2-40B4-BE49-F238E27FC236}">
+                <a16:creationId xmlns:a16="http://schemas.microsoft.com/office/drawing/2014/main" id="{8EA4E44D-C407-499F-A6CD-F5B08E62C09C}"/>
+              </a:ext>
+            </a:extLst>
+          </p:cNvPr>
+          <p:cNvPicPr/>
+          <p:nvPr/>
+        </p:nvPicPr>
+        <p:blipFill>
+          <a:blip r:embed="rId3" cstate="print">
+            <a:extLst>
+              <a:ext uri="{28A0092B-C50C-407E-A947-70E740481C1C}">
+                <a14:useLocalDpi xmlns:a14="http://schemas.microsoft.com/office/drawing/2010/main" val="0"/>
+              </a:ext>
+            </a:extLst>
+          </a:blip>
+          <a:stretch>
+            <a:fillRect/>
+          </a:stretch>
+        </p:blipFill>
+        <p:spPr>
+          <a:xfrm>
+            <a:off x="22836787" y="11910593"/>
+            <a:ext cx="2282997" cy="3919966"/>
+          </a:xfrm>
+          <a:prstGeom prst="rect">
+            <a:avLst/>
+          </a:prstGeom>
+        </p:spPr>
+      </p:pic>
+      <p:pic>
+        <p:nvPicPr>
+          <p:cNvPr id="32" name="Picture 31">
+            <a:extLst>
+              <a:ext uri="{FF2B5EF4-FFF2-40B4-BE49-F238E27FC236}">
+                <a16:creationId xmlns:a16="http://schemas.microsoft.com/office/drawing/2014/main" id="{BF51F1FC-D0D4-4B9F-8C2C-0D9A6B633119}"/>
+              </a:ext>
+            </a:extLst>
+          </p:cNvPr>
+          <p:cNvPicPr/>
+          <p:nvPr/>
+        </p:nvPicPr>
+        <p:blipFill>
+          <a:blip r:embed="rId4" cstate="print">
+            <a:extLst>
+              <a:ext uri="{28A0092B-C50C-407E-A947-70E740481C1C}">
+                <a14:useLocalDpi xmlns:a14="http://schemas.microsoft.com/office/drawing/2010/main" val="0"/>
+              </a:ext>
+            </a:extLst>
+          </a:blip>
+          <a:srcRect/>
+          <a:stretch>
+            <a:fillRect/>
+          </a:stretch>
+        </p:blipFill>
         <p:spPr bwMode="auto">
           <a:xfrm>
-            <a:off x="22783800" y="26174700"/>
-            <a:ext cx="8915400" cy="3598863"/>
-          </a:xfrm>
-          <a:prstGeom prst="rect">
-            <a:avLst/>
-          </a:prstGeom>
-          <a:solidFill>
-            <a:srgbClr val="EEEEEE"/>
-          </a:solidFill>
-          <a:ln w="9525">
-            <a:solidFill>
-              <a:schemeClr val="tx1"/>
-            </a:solidFill>
-            <a:miter lim="800000"/>
-            <a:headEnd/>
-            <a:tailEnd/>
+            <a:off x="26036490" y="11937089"/>
+            <a:ext cx="2297678" cy="3985794"/>
+          </a:xfrm>
+          <a:prstGeom prst="rect">
+            <a:avLst/>
+          </a:prstGeom>
+          <a:noFill/>
+          <a:ln>
+            <a:noFill/>
           </a:ln>
         </p:spPr>
+      </p:pic>
+      <p:pic>
+        <p:nvPicPr>
+          <p:cNvPr id="33" name="Picture 32">
+            <a:extLst>
+              <a:ext uri="{FF2B5EF4-FFF2-40B4-BE49-F238E27FC236}">
+                <a16:creationId xmlns:a16="http://schemas.microsoft.com/office/drawing/2014/main" id="{2459FD58-97A3-4014-A3C7-4BA6A0EDBF01}"/>
+              </a:ext>
+            </a:extLst>
+          </p:cNvPr>
+          <p:cNvPicPr/>
+          <p:nvPr/>
+        </p:nvPicPr>
+        <p:blipFill>
+          <a:blip r:embed="rId5" cstate="print">
+            <a:extLst>
+              <a:ext uri="{28A0092B-C50C-407E-A947-70E740481C1C}">
+                <a14:useLocalDpi xmlns:a14="http://schemas.microsoft.com/office/drawing/2010/main" val="0"/>
+              </a:ext>
+            </a:extLst>
+          </a:blip>
+          <a:srcRect/>
+          <a:stretch>
+            <a:fillRect/>
+          </a:stretch>
+        </p:blipFill>
+        <p:spPr bwMode="auto">
+          <a:xfrm>
+            <a:off x="29327336" y="11937089"/>
+            <a:ext cx="2364206" cy="4034066"/>
+          </a:xfrm>
+          <a:prstGeom prst="rect">
+            <a:avLst/>
+          </a:prstGeom>
+          <a:noFill/>
+          <a:ln>
+            <a:noFill/>
+          </a:ln>
+        </p:spPr>
+      </p:pic>
+      <p:sp>
+        <p:nvSpPr>
+          <p:cNvPr id="5" name="TextBox 4">
+            <a:extLst>
+              <a:ext uri="{FF2B5EF4-FFF2-40B4-BE49-F238E27FC236}">
+                <a16:creationId xmlns:a16="http://schemas.microsoft.com/office/drawing/2014/main" id="{23C276C9-DFC5-4820-9D43-8EC10E045841}"/>
+              </a:ext>
+            </a:extLst>
+          </p:cNvPr>
+          <p:cNvSpPr txBox="1"/>
+          <p:nvPr/>
+        </p:nvSpPr>
+        <p:spPr>
+          <a:xfrm>
+            <a:off x="23006928" y="16048084"/>
+            <a:ext cx="1731757" cy="430887"/>
+          </a:xfrm>
+          <a:prstGeom prst="rect">
+            <a:avLst/>
+          </a:prstGeom>
+          <a:noFill/>
+        </p:spPr>
         <p:txBody>
-          <a:bodyPr wrap="none" anchor="ctr"/>
+          <a:bodyPr wrap="square" rtlCol="0">
+            <a:spAutoFit/>
+          </a:bodyPr>
           <a:lstStyle/>
           <a:p>
-            <a:endParaRPr lang="en-US"/>
+            <a:r>
+              <a:rPr lang="en-US" sz="2200" b="1" i="1" dirty="0">
+                <a:latin typeface="Times New Roman" panose="02020603050405020304" pitchFamily="18" charset="0"/>
+                <a:cs typeface="Times New Roman" panose="02020603050405020304" pitchFamily="18" charset="0"/>
+              </a:rPr>
+              <a:t>Login Screen</a:t>
+            </a:r>
           </a:p>
         </p:txBody>
       </p:sp>
       <p:sp>
         <p:nvSpPr>
-          <p:cNvPr id="14348" name="Text Box 14"/>
-          <p:cNvSpPr txBox="1">
-            <a:spLocks noChangeArrowheads="1"/>
-          </p:cNvSpPr>
+          <p:cNvPr id="37" name="TextBox 36">
+            <a:extLst>
+              <a:ext uri="{FF2B5EF4-FFF2-40B4-BE49-F238E27FC236}">
+                <a16:creationId xmlns:a16="http://schemas.microsoft.com/office/drawing/2014/main" id="{BDD63E51-C26A-4999-B64D-93CB90695E98}"/>
+              </a:ext>
+            </a:extLst>
+          </p:cNvPr>
+          <p:cNvSpPr txBox="1"/>
           <p:nvPr/>
         </p:nvSpPr>
-        <p:spPr bwMode="auto">
-          <a:xfrm>
-            <a:off x="22783800" y="29994225"/>
-            <a:ext cx="8915400" cy="1323975"/>
+        <p:spPr>
+          <a:xfrm>
+            <a:off x="26280383" y="16067176"/>
+            <a:ext cx="1833968" cy="430887"/>
           </a:xfrm>
           <a:prstGeom prst="rect">
             <a:avLst/>
           </a:prstGeom>
           <a:noFill/>
-          <a:ln>
-            <a:noFill/>
-          </a:ln>
-          <a:extLst>
-            <a:ext uri="{909E8E84-426E-40dd-AFC4-6F175D3DCCD1}">
-              <a14:hiddenFill xmlns:a14="http://schemas.microsoft.com/office/drawing/2010/main" xmlns="">
-                <a:solidFill>
-                  <a:srgbClr val="FFFFFF"/>
-                </a:solidFill>
-              </a14:hiddenFill>
-            </a:ext>
-            <a:ext uri="{91240B29-F687-4f45-9708-019B960494DF}">
-              <a14:hiddenLine xmlns:a14="http://schemas.microsoft.com/office/drawing/2010/main" xmlns="" w="9525">
-                <a:solidFill>
-                  <a:srgbClr val="000000"/>
-                </a:solidFill>
-                <a:miter lim="800000"/>
-                <a:headEnd/>
-                <a:tailEnd/>
-              </a14:hiddenLine>
-            </a:ext>
-          </a:extLst>
         </p:spPr>
         <p:txBody>
-          <a:bodyPr lIns="0" rIns="0">
+          <a:bodyPr wrap="square" rtlCol="0">
             <a:spAutoFit/>
           </a:bodyPr>
-          <a:lstStyle>
-            <a:lvl1pPr eaLnBrk="0" hangingPunct="0">
-              <a:defRPr sz="8600">
-                <a:solidFill>
-                  <a:schemeClr val="tx1"/>
-                </a:solidFill>
-                <a:latin typeface="Arial" charset="0"/>
-                <a:ea typeface="ＭＳ Ｐゴシック" charset="0"/>
-                <a:cs typeface="ＭＳ Ｐゴシック" charset="0"/>
-              </a:defRPr>
-            </a:lvl1pPr>
-            <a:lvl2pPr marL="742950" indent="-285750" eaLnBrk="0" hangingPunct="0">
-              <a:defRPr sz="8600">
-                <a:solidFill>
-                  <a:schemeClr val="tx1"/>
-                </a:solidFill>
-                <a:latin typeface="Arial" charset="0"/>
-                <a:ea typeface="ＭＳ Ｐゴシック" charset="0"/>
-              </a:defRPr>
-            </a:lvl2pPr>
-            <a:lvl3pPr marL="1143000" indent="-228600" eaLnBrk="0" hangingPunct="0">
-              <a:defRPr sz="8600">
-                <a:solidFill>
-                  <a:schemeClr val="tx1"/>
-                </a:solidFill>
-                <a:latin typeface="Arial" charset="0"/>
-                <a:ea typeface="ＭＳ Ｐゴシック" charset="0"/>
-              </a:defRPr>
-            </a:lvl3pPr>
-            <a:lvl4pPr marL="1600200" indent="-228600" eaLnBrk="0" hangingPunct="0">
-              <a:defRPr sz="8600">
-                <a:solidFill>
-                  <a:schemeClr val="tx1"/>
-                </a:solidFill>
-                <a:latin typeface="Arial" charset="0"/>
-                <a:ea typeface="ＭＳ Ｐゴシック" charset="0"/>
-              </a:defRPr>
-            </a:lvl4pPr>
-            <a:lvl5pPr marL="2057400" indent="-228600" eaLnBrk="0" hangingPunct="0">
-              <a:defRPr sz="8600">
-                <a:solidFill>
-                  <a:schemeClr val="tx1"/>
-                </a:solidFill>
-                <a:latin typeface="Arial" charset="0"/>
-                <a:ea typeface="ＭＳ Ｐゴシック" charset="0"/>
-              </a:defRPr>
-            </a:lvl5pPr>
-            <a:lvl6pPr marL="2514600" indent="-228600" defTabSz="2193925" eaLnBrk="0" fontAlgn="base" hangingPunct="0">
-              <a:spcBef>
-                <a:spcPct val="0"/>
-              </a:spcBef>
-              <a:spcAft>
-                <a:spcPct val="0"/>
-              </a:spcAft>
-              <a:defRPr sz="8600">
-                <a:solidFill>
-                  <a:schemeClr val="tx1"/>
-                </a:solidFill>
-                <a:latin typeface="Arial" charset="0"/>
-                <a:ea typeface="ＭＳ Ｐゴシック" charset="0"/>
-              </a:defRPr>
-            </a:lvl6pPr>
-            <a:lvl7pPr marL="2971800" indent="-228600" defTabSz="2193925" eaLnBrk="0" fontAlgn="base" hangingPunct="0">
-              <a:spcBef>
-                <a:spcPct val="0"/>
-              </a:spcBef>
-              <a:spcAft>
-                <a:spcPct val="0"/>
-              </a:spcAft>
-              <a:defRPr sz="8600">
-                <a:solidFill>
-                  <a:schemeClr val="tx1"/>
-                </a:solidFill>
-                <a:latin typeface="Arial" charset="0"/>
-                <a:ea typeface="ＭＳ Ｐゴシック" charset="0"/>
-              </a:defRPr>
-            </a:lvl7pPr>
-            <a:lvl8pPr marL="3429000" indent="-228600" defTabSz="2193925" eaLnBrk="0" fontAlgn="base" hangingPunct="0">
-              <a:spcBef>
-                <a:spcPct val="0"/>
-              </a:spcBef>
-              <a:spcAft>
-                <a:spcPct val="0"/>
-              </a:spcAft>
-              <a:defRPr sz="8600">
-                <a:solidFill>
-                  <a:schemeClr val="tx1"/>
-                </a:solidFill>
-                <a:latin typeface="Arial" charset="0"/>
-                <a:ea typeface="ＭＳ Ｐゴシック" charset="0"/>
-              </a:defRPr>
-            </a:lvl8pPr>
-            <a:lvl9pPr marL="3886200" indent="-228600" defTabSz="2193925" eaLnBrk="0" fontAlgn="base" hangingPunct="0">
-              <a:spcBef>
-                <a:spcPct val="0"/>
-              </a:spcBef>
-              <a:spcAft>
-                <a:spcPct val="0"/>
-              </a:spcAft>
-              <a:defRPr sz="8600">
-                <a:solidFill>
-                  <a:schemeClr val="tx1"/>
-                </a:solidFill>
-                <a:latin typeface="Arial" charset="0"/>
-                <a:ea typeface="ＭＳ Ｐゴシック" charset="0"/>
-              </a:defRPr>
-            </a:lvl9pPr>
-          </a:lstStyle>
-          <a:p>
-            <a:pPr eaLnBrk="1" hangingPunct="1"/>
-            <a:r>
-              <a:rPr lang="en-AU" sz="2000" i="1" dirty="0"/>
-              <a:t>Captions set in a serif style font such as Times, 18 to 24 size, italic style. </a:t>
-            </a:r>
-          </a:p>
-          <a:p>
-            <a:pPr eaLnBrk="1" hangingPunct="1"/>
-            <a:endParaRPr lang="en-AU" sz="2000" i="1" dirty="0"/>
-          </a:p>
-          <a:p>
-            <a:pPr eaLnBrk="1" hangingPunct="1"/>
-            <a:r>
-              <a:rPr lang="en-US" sz="2000" i="1" dirty="0"/>
-              <a:t>Duis </a:t>
-            </a:r>
-            <a:r>
-              <a:rPr lang="en-US" sz="2000" i="1" dirty="0" err="1"/>
-              <a:t>autem</a:t>
-            </a:r>
-            <a:r>
-              <a:rPr lang="en-US" sz="2000" i="1" dirty="0"/>
-              <a:t> vel </a:t>
-            </a:r>
-            <a:r>
-              <a:rPr lang="en-US" sz="2000" i="1" dirty="0" err="1"/>
-              <a:t>eum</a:t>
-            </a:r>
-            <a:r>
-              <a:rPr lang="en-US" sz="2000" i="1" dirty="0"/>
-              <a:t> </a:t>
-            </a:r>
-            <a:r>
-              <a:rPr lang="en-US" sz="2000" i="1" dirty="0" err="1"/>
-              <a:t>iriure</a:t>
-            </a:r>
-            <a:r>
-              <a:rPr lang="en-US" sz="2000" i="1" dirty="0"/>
-              <a:t> dolor in </a:t>
-            </a:r>
-            <a:r>
-              <a:rPr lang="en-US" sz="2000" i="1" dirty="0" err="1"/>
-              <a:t>hendrerit</a:t>
-            </a:r>
-            <a:r>
-              <a:rPr lang="en-US" sz="2000" i="1" dirty="0"/>
-              <a:t> in </a:t>
-            </a:r>
-            <a:r>
-              <a:rPr lang="en-US" sz="2000" i="1" dirty="0" err="1"/>
-              <a:t>vulputate</a:t>
-            </a:r>
-            <a:r>
-              <a:rPr lang="en-US" sz="2000" i="1" dirty="0"/>
-              <a:t> </a:t>
-            </a:r>
-            <a:r>
-              <a:rPr lang="en-US" sz="2000" i="1" dirty="0" err="1"/>
-              <a:t>velit</a:t>
-            </a:r>
-            <a:r>
-              <a:rPr lang="en-US" sz="2000" i="1" dirty="0"/>
-              <a:t> </a:t>
-            </a:r>
-            <a:r>
-              <a:rPr lang="en-US" sz="2000" i="1" dirty="0" err="1"/>
-              <a:t>esse</a:t>
-            </a:r>
-            <a:r>
-              <a:rPr lang="en-US" sz="2000" i="1" dirty="0"/>
-              <a:t> </a:t>
-            </a:r>
-            <a:r>
-              <a:rPr lang="en-US" sz="2000" i="1" dirty="0" err="1"/>
-              <a:t>molestie</a:t>
-            </a:r>
-            <a:r>
-              <a:rPr lang="en-US" sz="2000" i="1" dirty="0"/>
-              <a:t> </a:t>
-            </a:r>
-            <a:r>
-              <a:rPr lang="en-US" sz="2000" i="1" dirty="0" err="1"/>
-              <a:t>consequat</a:t>
-            </a:r>
-            <a:r>
-              <a:rPr lang="en-US" sz="2000" i="1" dirty="0"/>
-              <a:t>.</a:t>
-            </a:r>
-            <a:endParaRPr lang="en-AU" sz="2000" i="1" dirty="0"/>
+          <a:lstStyle/>
+          <a:p>
+            <a:r>
+              <a:rPr lang="en-US" sz="2200" b="1" i="1" dirty="0">
+                <a:latin typeface="Times New Roman" panose="02020603050405020304" pitchFamily="18" charset="0"/>
+                <a:cs typeface="Times New Roman" panose="02020603050405020304" pitchFamily="18" charset="0"/>
+              </a:rPr>
+              <a:t>Home Screen</a:t>
+            </a:r>
           </a:p>
         </p:txBody>
       </p:sp>
       <p:sp>
         <p:nvSpPr>
-          <p:cNvPr id="14349" name="Rectangle 15"/>
-          <p:cNvSpPr>
-            <a:spLocks noChangeArrowheads="1"/>
-          </p:cNvSpPr>
+          <p:cNvPr id="38" name="TextBox 37">
+            <a:extLst>
+              <a:ext uri="{FF2B5EF4-FFF2-40B4-BE49-F238E27FC236}">
+                <a16:creationId xmlns:a16="http://schemas.microsoft.com/office/drawing/2014/main" id="{14FBC4D0-D455-422C-BCCA-BA2FA3FA11A8}"/>
+              </a:ext>
+            </a:extLst>
+          </p:cNvPr>
+          <p:cNvSpPr txBox="1"/>
           <p:nvPr/>
         </p:nvSpPr>
-        <p:spPr bwMode="auto">
-          <a:xfrm>
-            <a:off x="22783800" y="21996400"/>
-            <a:ext cx="5399088" cy="3598863"/>
-          </a:xfrm>
-          <a:prstGeom prst="rect">
-            <a:avLst/>
-          </a:prstGeom>
-          <a:solidFill>
-            <a:srgbClr val="EEEEEE"/>
-          </a:solidFill>
-          <a:ln w="9525">
-            <a:solidFill>
-              <a:schemeClr val="tx1"/>
-            </a:solidFill>
-            <a:miter lim="800000"/>
-            <a:headEnd/>
-            <a:tailEnd/>
-          </a:ln>
+        <p:spPr>
+          <a:xfrm>
+            <a:off x="29141150" y="16091087"/>
+            <a:ext cx="2736578" cy="430887"/>
+          </a:xfrm>
+          <a:prstGeom prst="rect">
+            <a:avLst/>
+          </a:prstGeom>
+          <a:noFill/>
         </p:spPr>
         <p:txBody>
-          <a:bodyPr wrap="none" anchor="ctr"/>
+          <a:bodyPr wrap="square" rtlCol="0">
+            <a:spAutoFit/>
+          </a:bodyPr>
           <a:lstStyle/>
           <a:p>
-            <a:endParaRPr lang="en-US"/>
+            <a:r>
+              <a:rPr lang="en-US" sz="2200" b="1" i="1" dirty="0">
+                <a:latin typeface="Times New Roman" panose="02020603050405020304" pitchFamily="18" charset="0"/>
+                <a:cs typeface="Times New Roman" panose="02020603050405020304" pitchFamily="18" charset="0"/>
+              </a:rPr>
+              <a:t>‘View Details’ Screen</a:t>
+            </a:r>
           </a:p>
         </p:txBody>
       </p:sp>
       <p:sp>
         <p:nvSpPr>
-          <p:cNvPr id="14350" name="Text Box 16"/>
-          <p:cNvSpPr txBox="1">
-            <a:spLocks noChangeArrowheads="1"/>
-          </p:cNvSpPr>
+          <p:cNvPr id="6" name="Arrow: Striped Right 5">
+            <a:extLst>
+              <a:ext uri="{FF2B5EF4-FFF2-40B4-BE49-F238E27FC236}">
+                <a16:creationId xmlns:a16="http://schemas.microsoft.com/office/drawing/2014/main" id="{630912C3-A9A7-42C1-94BE-B8440C6FF50E}"/>
+              </a:ext>
+            </a:extLst>
+          </p:cNvPr>
+          <p:cNvSpPr/>
           <p:nvPr/>
         </p:nvSpPr>
-        <p:spPr bwMode="auto">
-          <a:xfrm>
-            <a:off x="28194000" y="21790025"/>
-            <a:ext cx="3505200" cy="2825750"/>
-          </a:xfrm>
-          <a:prstGeom prst="rect">
-            <a:avLst/>
-          </a:prstGeom>
-          <a:noFill/>
+        <p:spPr>
+          <a:xfrm>
+            <a:off x="25001497" y="13389124"/>
+            <a:ext cx="1059935" cy="685800"/>
+          </a:xfrm>
+          <a:prstGeom prst="stripedRightArrow">
+            <a:avLst/>
+          </a:prstGeom>
+          <a:gradFill>
+            <a:gsLst>
+              <a:gs pos="0">
+                <a:srgbClr val="2166FF"/>
+              </a:gs>
+              <a:gs pos="100000">
+                <a:schemeClr val="accent1">
+                  <a:tint val="50000"/>
+                  <a:shade val="100000"/>
+                  <a:satMod val="350000"/>
+                </a:schemeClr>
+              </a:gs>
+            </a:gsLst>
+          </a:gradFill>
           <a:ln>
-            <a:noFill/>
+            <a:solidFill>
+              <a:srgbClr val="92D050"/>
+            </a:solidFill>
           </a:ln>
-          <a:extLst>
-            <a:ext uri="{909E8E84-426E-40dd-AFC4-6F175D3DCCD1}">
-              <a14:hiddenFill xmlns:a14="http://schemas.microsoft.com/office/drawing/2010/main" xmlns="">
-                <a:solidFill>
-                  <a:srgbClr val="FFFFFF"/>
-                </a:solidFill>
-              </a14:hiddenFill>
-            </a:ext>
-            <a:ext uri="{91240B29-F687-4f45-9708-019B960494DF}">
-              <a14:hiddenLine xmlns:a14="http://schemas.microsoft.com/office/drawing/2010/main" xmlns="" w="9525">
-                <a:solidFill>
-                  <a:srgbClr val="000000"/>
-                </a:solidFill>
-                <a:miter lim="800000"/>
-                <a:headEnd/>
-                <a:tailEnd/>
-              </a14:hiddenLine>
-            </a:ext>
-          </a:extLst>
-        </p:spPr>
+        </p:spPr>
+        <p:style>
+          <a:lnRef idx="1">
+            <a:schemeClr val="accent1"/>
+          </a:lnRef>
+          <a:fillRef idx="3">
+            <a:schemeClr val="accent1"/>
+          </a:fillRef>
+          <a:effectRef idx="2">
+            <a:schemeClr val="accent1"/>
+          </a:effectRef>
+          <a:fontRef idx="minor">
+            <a:schemeClr val="lt1"/>
+          </a:fontRef>
+        </p:style>
         <p:txBody>
-          <a:bodyPr lIns="180000" tIns="180000" rIns="180000" bIns="180000">
-            <a:spAutoFit/>
-          </a:bodyPr>
-          <a:lstStyle>
-            <a:lvl1pPr eaLnBrk="0" hangingPunct="0">
-              <a:defRPr sz="8600">
-                <a:solidFill>
-                  <a:schemeClr val="tx1"/>
-                </a:solidFill>
-                <a:latin typeface="Arial" charset="0"/>
-                <a:ea typeface="ＭＳ Ｐゴシック" charset="0"/>
-                <a:cs typeface="ＭＳ Ｐゴシック" charset="0"/>
-              </a:defRPr>
-            </a:lvl1pPr>
-            <a:lvl2pPr marL="742950" indent="-285750" eaLnBrk="0" hangingPunct="0">
-              <a:defRPr sz="8600">
-                <a:solidFill>
-                  <a:schemeClr val="tx1"/>
-                </a:solidFill>
-                <a:latin typeface="Arial" charset="0"/>
-                <a:ea typeface="ＭＳ Ｐゴシック" charset="0"/>
-              </a:defRPr>
-            </a:lvl2pPr>
-            <a:lvl3pPr marL="1143000" indent="-228600" eaLnBrk="0" hangingPunct="0">
-              <a:defRPr sz="8600">
-                <a:solidFill>
-                  <a:schemeClr val="tx1"/>
-                </a:solidFill>
-                <a:latin typeface="Arial" charset="0"/>
-                <a:ea typeface="ＭＳ Ｐゴシック" charset="0"/>
-              </a:defRPr>
-            </a:lvl3pPr>
-            <a:lvl4pPr marL="1600200" indent="-228600" eaLnBrk="0" hangingPunct="0">
-              <a:defRPr sz="8600">
-                <a:solidFill>
-                  <a:schemeClr val="tx1"/>
-                </a:solidFill>
-                <a:latin typeface="Arial" charset="0"/>
-                <a:ea typeface="ＭＳ Ｐゴシック" charset="0"/>
-              </a:defRPr>
-            </a:lvl4pPr>
-            <a:lvl5pPr marL="2057400" indent="-228600" eaLnBrk="0" hangingPunct="0">
-              <a:defRPr sz="8600">
-                <a:solidFill>
-                  <a:schemeClr val="tx1"/>
-                </a:solidFill>
-                <a:latin typeface="Arial" charset="0"/>
-                <a:ea typeface="ＭＳ Ｐゴシック" charset="0"/>
-              </a:defRPr>
-            </a:lvl5pPr>
-            <a:lvl6pPr marL="2514600" indent="-228600" defTabSz="2193925" eaLnBrk="0" fontAlgn="base" hangingPunct="0">
-              <a:spcBef>
-                <a:spcPct val="0"/>
-              </a:spcBef>
-              <a:spcAft>
-                <a:spcPct val="0"/>
-              </a:spcAft>
-              <a:defRPr sz="8600">
-                <a:solidFill>
-                  <a:schemeClr val="tx1"/>
-                </a:solidFill>
-                <a:latin typeface="Arial" charset="0"/>
-                <a:ea typeface="ＭＳ Ｐゴシック" charset="0"/>
-              </a:defRPr>
-            </a:lvl6pPr>
-            <a:lvl7pPr marL="2971800" indent="-228600" defTabSz="2193925" eaLnBrk="0" fontAlgn="base" hangingPunct="0">
-              <a:spcBef>
-                <a:spcPct val="0"/>
-              </a:spcBef>
-              <a:spcAft>
-                <a:spcPct val="0"/>
-              </a:spcAft>
-              <a:defRPr sz="8600">
-                <a:solidFill>
-                  <a:schemeClr val="tx1"/>
-                </a:solidFill>
-                <a:latin typeface="Arial" charset="0"/>
-                <a:ea typeface="ＭＳ Ｐゴシック" charset="0"/>
-              </a:defRPr>
-            </a:lvl7pPr>
-            <a:lvl8pPr marL="3429000" indent="-228600" defTabSz="2193925" eaLnBrk="0" fontAlgn="base" hangingPunct="0">
-              <a:spcBef>
-                <a:spcPct val="0"/>
-              </a:spcBef>
-              <a:spcAft>
-                <a:spcPct val="0"/>
-              </a:spcAft>
-              <a:defRPr sz="8600">
-                <a:solidFill>
-                  <a:schemeClr val="tx1"/>
-                </a:solidFill>
-                <a:latin typeface="Arial" charset="0"/>
-                <a:ea typeface="ＭＳ Ｐゴシック" charset="0"/>
-              </a:defRPr>
-            </a:lvl8pPr>
-            <a:lvl9pPr marL="3886200" indent="-228600" defTabSz="2193925" eaLnBrk="0" fontAlgn="base" hangingPunct="0">
-              <a:spcBef>
-                <a:spcPct val="0"/>
-              </a:spcBef>
-              <a:spcAft>
-                <a:spcPct val="0"/>
-              </a:spcAft>
-              <a:defRPr sz="8600">
-                <a:solidFill>
-                  <a:schemeClr val="tx1"/>
-                </a:solidFill>
-                <a:latin typeface="Arial" charset="0"/>
-                <a:ea typeface="ＭＳ Ｐゴシック" charset="0"/>
-              </a:defRPr>
-            </a:lvl9pPr>
-          </a:lstStyle>
-          <a:p>
-            <a:pPr eaLnBrk="1" hangingPunct="1"/>
-            <a:r>
-              <a:rPr lang="en-AU" sz="2000" i="1" dirty="0"/>
-              <a:t>Captions set in a serif style font such as Times, 18 to 24 size, italic style. </a:t>
-            </a:r>
-          </a:p>
-          <a:p>
-            <a:pPr eaLnBrk="1" hangingPunct="1"/>
-            <a:endParaRPr lang="en-AU" sz="2000" i="1" dirty="0"/>
-          </a:p>
-          <a:p>
-            <a:pPr eaLnBrk="1" hangingPunct="1"/>
-            <a:r>
-              <a:rPr lang="en-US" sz="2000" i="1" dirty="0"/>
-              <a:t>Duis </a:t>
-            </a:r>
-            <a:r>
-              <a:rPr lang="en-US" sz="2000" i="1" dirty="0" err="1"/>
-              <a:t>autem</a:t>
-            </a:r>
-            <a:r>
-              <a:rPr lang="en-US" sz="2000" i="1" dirty="0"/>
-              <a:t> vel </a:t>
-            </a:r>
-            <a:r>
-              <a:rPr lang="en-US" sz="2000" i="1" dirty="0" err="1"/>
-              <a:t>eum</a:t>
-            </a:r>
-            <a:r>
-              <a:rPr lang="en-US" sz="2000" i="1" dirty="0"/>
-              <a:t> </a:t>
-            </a:r>
-            <a:r>
-              <a:rPr lang="en-US" sz="2000" i="1" dirty="0" err="1"/>
-              <a:t>iriure</a:t>
-            </a:r>
-            <a:r>
-              <a:rPr lang="en-US" sz="2000" i="1" dirty="0"/>
-              <a:t> dolor in </a:t>
-            </a:r>
-            <a:r>
-              <a:rPr lang="en-US" sz="2000" i="1" dirty="0" err="1"/>
-              <a:t>hendrerit</a:t>
-            </a:r>
-            <a:r>
-              <a:rPr lang="en-US" sz="2000" i="1" dirty="0"/>
-              <a:t> in </a:t>
-            </a:r>
-            <a:r>
-              <a:rPr lang="en-US" sz="2000" i="1" dirty="0" err="1"/>
-              <a:t>vulputate</a:t>
-            </a:r>
-            <a:r>
-              <a:rPr lang="en-US" sz="2000" i="1" dirty="0"/>
-              <a:t> </a:t>
-            </a:r>
-            <a:r>
-              <a:rPr lang="en-US" sz="2000" i="1" dirty="0" err="1"/>
-              <a:t>velit</a:t>
-            </a:r>
-            <a:r>
-              <a:rPr lang="en-US" sz="2000" i="1" dirty="0"/>
-              <a:t> </a:t>
-            </a:r>
-            <a:r>
-              <a:rPr lang="en-US" sz="2000" i="1" dirty="0" err="1"/>
-              <a:t>esse</a:t>
-            </a:r>
-            <a:r>
-              <a:rPr lang="en-US" sz="2000" i="1" dirty="0"/>
-              <a:t> </a:t>
-            </a:r>
-            <a:r>
-              <a:rPr lang="en-US" sz="2000" i="1" dirty="0" err="1"/>
-              <a:t>molestie</a:t>
-            </a:r>
-            <a:r>
-              <a:rPr lang="en-US" sz="2000" i="1" dirty="0"/>
-              <a:t> </a:t>
-            </a:r>
-            <a:r>
-              <a:rPr lang="en-US" sz="2000" i="1" dirty="0" err="1"/>
-              <a:t>consequat</a:t>
-            </a:r>
-            <a:r>
-              <a:rPr lang="en-US" sz="2000" i="1" dirty="0"/>
-              <a:t>.</a:t>
-            </a:r>
-            <a:endParaRPr lang="en-AU" sz="2000" i="1" dirty="0"/>
+          <a:bodyPr rtlCol="0" anchor="ctr"/>
+          <a:lstStyle/>
+          <a:p>
+            <a:pPr algn="ctr"/>
+            <a:endParaRPr lang="en-US" dirty="0"/>
           </a:p>
         </p:txBody>
       </p:sp>
       <p:sp>
         <p:nvSpPr>
-          <p:cNvPr id="14352" name="Rectangle 18"/>
-          <p:cNvSpPr>
-            <a:spLocks noChangeArrowheads="1"/>
-          </p:cNvSpPr>
+          <p:cNvPr id="7" name="Arrow: Striped Right 6">
+            <a:extLst>
+              <a:ext uri="{FF2B5EF4-FFF2-40B4-BE49-F238E27FC236}">
+                <a16:creationId xmlns:a16="http://schemas.microsoft.com/office/drawing/2014/main" id="{2C26FEB7-7CDB-446F-87E3-A8C9FDB30905}"/>
+              </a:ext>
+            </a:extLst>
+          </p:cNvPr>
+          <p:cNvSpPr/>
           <p:nvPr/>
         </p:nvSpPr>
-        <p:spPr bwMode="auto">
-          <a:xfrm>
-            <a:off x="15708313" y="21996400"/>
-            <a:ext cx="5399087" cy="3598863"/>
-          </a:xfrm>
-          <a:prstGeom prst="rect">
-            <a:avLst/>
-          </a:prstGeom>
-          <a:solidFill>
-            <a:srgbClr val="EEEEEE"/>
-          </a:solidFill>
-          <a:ln w="9525">
+        <p:spPr>
+          <a:xfrm>
+            <a:off x="28333986" y="13374117"/>
+            <a:ext cx="966772" cy="685800"/>
+          </a:xfrm>
+          <a:prstGeom prst="stripedRightArrow">
+            <a:avLst/>
+          </a:prstGeom>
+          <a:gradFill>
+            <a:gsLst>
+              <a:gs pos="0">
+                <a:srgbClr val="92D050"/>
+              </a:gs>
+              <a:gs pos="100000">
+                <a:schemeClr val="accent1">
+                  <a:tint val="50000"/>
+                  <a:shade val="100000"/>
+                  <a:satMod val="350000"/>
+                </a:schemeClr>
+              </a:gs>
+            </a:gsLst>
+            <a:lin ang="16200000" scaled="0"/>
+          </a:gradFill>
+          <a:ln>
             <a:solidFill>
-              <a:schemeClr val="tx1"/>
+              <a:srgbClr val="92D050"/>
             </a:solidFill>
-            <a:miter lim="800000"/>
-            <a:headEnd/>
-            <a:tailEnd/>
           </a:ln>
         </p:spPr>
+        <p:style>
+          <a:lnRef idx="1">
+            <a:schemeClr val="accent1"/>
+          </a:lnRef>
+          <a:fillRef idx="3">
+            <a:schemeClr val="accent1"/>
+          </a:fillRef>
+          <a:effectRef idx="2">
+            <a:schemeClr val="accent1"/>
+          </a:effectRef>
+          <a:fontRef idx="minor">
+            <a:schemeClr val="lt1"/>
+          </a:fontRef>
+        </p:style>
         <p:txBody>
-          <a:bodyPr wrap="none" anchor="ctr"/>
+          <a:bodyPr rtlCol="0" anchor="ctr"/>
           <a:lstStyle/>
           <a:p>
-            <a:endParaRPr lang="en-US"/>
+            <a:pPr algn="ctr"/>
+            <a:endParaRPr lang="en-US" dirty="0"/>
+          </a:p>
+        </p:txBody>
+      </p:sp>
+      <p:pic>
+        <p:nvPicPr>
+          <p:cNvPr id="41" name="Picture 40">
+            <a:extLst>
+              <a:ext uri="{FF2B5EF4-FFF2-40B4-BE49-F238E27FC236}">
+                <a16:creationId xmlns:a16="http://schemas.microsoft.com/office/drawing/2014/main" id="{28592079-B80C-492C-9AA9-8266D10D083C}"/>
+              </a:ext>
+            </a:extLst>
+          </p:cNvPr>
+          <p:cNvPicPr/>
+          <p:nvPr/>
+        </p:nvPicPr>
+        <p:blipFill>
+          <a:blip r:embed="rId6"/>
+          <a:stretch>
+            <a:fillRect/>
+          </a:stretch>
+        </p:blipFill>
+        <p:spPr>
+          <a:xfrm>
+            <a:off x="22727254" y="20557151"/>
+            <a:ext cx="2742802" cy="3252769"/>
+          </a:xfrm>
+          <a:prstGeom prst="rect">
+            <a:avLst/>
+          </a:prstGeom>
+        </p:spPr>
+      </p:pic>
+      <p:pic>
+        <p:nvPicPr>
+          <p:cNvPr id="43" name="Picture 42">
+            <a:extLst>
+              <a:ext uri="{FF2B5EF4-FFF2-40B4-BE49-F238E27FC236}">
+                <a16:creationId xmlns:a16="http://schemas.microsoft.com/office/drawing/2014/main" id="{5CA70F25-DBD0-432B-BCE7-F65298C5D216}"/>
+              </a:ext>
+            </a:extLst>
+          </p:cNvPr>
+          <p:cNvPicPr/>
+          <p:nvPr/>
+        </p:nvPicPr>
+        <p:blipFill>
+          <a:blip r:embed="rId7"/>
+          <a:stretch>
+            <a:fillRect/>
+          </a:stretch>
+        </p:blipFill>
+        <p:spPr>
+          <a:xfrm>
+            <a:off x="25651650" y="20557151"/>
+            <a:ext cx="2886980" cy="3252769"/>
+          </a:xfrm>
+          <a:prstGeom prst="rect">
+            <a:avLst/>
+          </a:prstGeom>
+        </p:spPr>
+      </p:pic>
+      <p:pic>
+        <p:nvPicPr>
+          <p:cNvPr id="44" name="Picture 43">
+            <a:extLst>
+              <a:ext uri="{FF2B5EF4-FFF2-40B4-BE49-F238E27FC236}">
+                <a16:creationId xmlns:a16="http://schemas.microsoft.com/office/drawing/2014/main" id="{7F8ACCCA-EAE3-486A-ACCC-492A8D692998}"/>
+              </a:ext>
+            </a:extLst>
+          </p:cNvPr>
+          <p:cNvPicPr/>
+          <p:nvPr/>
+        </p:nvPicPr>
+        <p:blipFill>
+          <a:blip r:embed="rId8"/>
+          <a:stretch>
+            <a:fillRect/>
+          </a:stretch>
+        </p:blipFill>
+        <p:spPr>
+          <a:xfrm>
+            <a:off x="28755718" y="25672680"/>
+            <a:ext cx="2840687" cy="2447376"/>
+          </a:xfrm>
+          <a:prstGeom prst="rect">
+            <a:avLst/>
+          </a:prstGeom>
+        </p:spPr>
+      </p:pic>
+      <p:pic>
+        <p:nvPicPr>
+          <p:cNvPr id="46" name="Picture 45">
+            <a:extLst>
+              <a:ext uri="{FF2B5EF4-FFF2-40B4-BE49-F238E27FC236}">
+                <a16:creationId xmlns:a16="http://schemas.microsoft.com/office/drawing/2014/main" id="{B53851F3-8543-4CC3-B9FD-085D347ECCDE}"/>
+              </a:ext>
+            </a:extLst>
+          </p:cNvPr>
+          <p:cNvPicPr/>
+          <p:nvPr/>
+        </p:nvPicPr>
+        <p:blipFill>
+          <a:blip r:embed="rId9"/>
+          <a:stretch>
+            <a:fillRect/>
+          </a:stretch>
+        </p:blipFill>
+        <p:spPr>
+          <a:xfrm>
+            <a:off x="25894334" y="25628432"/>
+            <a:ext cx="2500416" cy="1148898"/>
+          </a:xfrm>
+          <a:prstGeom prst="rect">
+            <a:avLst/>
+          </a:prstGeom>
+        </p:spPr>
+      </p:pic>
+      <p:pic>
+        <p:nvPicPr>
+          <p:cNvPr id="47" name="Picture 46">
+            <a:extLst>
+              <a:ext uri="{FF2B5EF4-FFF2-40B4-BE49-F238E27FC236}">
+                <a16:creationId xmlns:a16="http://schemas.microsoft.com/office/drawing/2014/main" id="{5CD790DE-AB91-4AB0-9A55-5BD5F95A92C6}"/>
+              </a:ext>
+            </a:extLst>
+          </p:cNvPr>
+          <p:cNvPicPr/>
+          <p:nvPr/>
+        </p:nvPicPr>
+        <p:blipFill>
+          <a:blip r:embed="rId10"/>
+          <a:stretch>
+            <a:fillRect/>
+          </a:stretch>
+        </p:blipFill>
+        <p:spPr>
+          <a:xfrm>
+            <a:off x="22801954" y="25628432"/>
+            <a:ext cx="2742802" cy="2491624"/>
+          </a:xfrm>
+          <a:prstGeom prst="rect">
+            <a:avLst/>
+          </a:prstGeom>
+        </p:spPr>
+      </p:pic>
+      <p:pic>
+        <p:nvPicPr>
+          <p:cNvPr id="48" name="Picture 47">
+            <a:extLst>
+              <a:ext uri="{FF2B5EF4-FFF2-40B4-BE49-F238E27FC236}">
+                <a16:creationId xmlns:a16="http://schemas.microsoft.com/office/drawing/2014/main" id="{010A58BA-8C58-4027-A8E7-5AC1B5877135}"/>
+              </a:ext>
+            </a:extLst>
+          </p:cNvPr>
+          <p:cNvPicPr/>
+          <p:nvPr/>
+        </p:nvPicPr>
+        <p:blipFill>
+          <a:blip r:embed="rId11"/>
+          <a:stretch>
+            <a:fillRect/>
+          </a:stretch>
+        </p:blipFill>
+        <p:spPr>
+          <a:xfrm>
+            <a:off x="25880091" y="27058483"/>
+            <a:ext cx="2323485" cy="876268"/>
+          </a:xfrm>
+          <a:prstGeom prst="rect">
+            <a:avLst/>
+          </a:prstGeom>
+        </p:spPr>
+      </p:pic>
+      <p:pic>
+        <p:nvPicPr>
+          <p:cNvPr id="49" name="Picture 48">
+            <a:extLst>
+              <a:ext uri="{FF2B5EF4-FFF2-40B4-BE49-F238E27FC236}">
+                <a16:creationId xmlns:a16="http://schemas.microsoft.com/office/drawing/2014/main" id="{7C640850-6D56-4A7E-8975-87ADD56C9BED}"/>
+              </a:ext>
+            </a:extLst>
+          </p:cNvPr>
+          <p:cNvPicPr/>
+          <p:nvPr/>
+        </p:nvPicPr>
+        <p:blipFill>
+          <a:blip r:embed="rId12"/>
+          <a:stretch>
+            <a:fillRect/>
+          </a:stretch>
+        </p:blipFill>
+        <p:spPr>
+          <a:xfrm>
+            <a:off x="28720814" y="20498858"/>
+            <a:ext cx="2742803" cy="3311062"/>
+          </a:xfrm>
+          <a:prstGeom prst="rect">
+            <a:avLst/>
+          </a:prstGeom>
+        </p:spPr>
+      </p:pic>
+      <p:pic>
+        <p:nvPicPr>
+          <p:cNvPr id="50" name="Picture 49">
+            <a:extLst>
+              <a:ext uri="{FF2B5EF4-FFF2-40B4-BE49-F238E27FC236}">
+                <a16:creationId xmlns:a16="http://schemas.microsoft.com/office/drawing/2014/main" id="{ED89B030-76D0-4598-8D36-0D87E64AF25C}"/>
+              </a:ext>
+            </a:extLst>
+          </p:cNvPr>
+          <p:cNvPicPr/>
+          <p:nvPr/>
+        </p:nvPicPr>
+        <p:blipFill>
+          <a:blip r:embed="rId13"/>
+          <a:stretch>
+            <a:fillRect/>
+          </a:stretch>
+        </p:blipFill>
+        <p:spPr>
+          <a:xfrm>
+            <a:off x="22728443" y="30528215"/>
+            <a:ext cx="2391341" cy="1259841"/>
+          </a:xfrm>
+          <a:prstGeom prst="rect">
+            <a:avLst/>
+          </a:prstGeom>
+        </p:spPr>
+      </p:pic>
+      <p:sp>
+        <p:nvSpPr>
+          <p:cNvPr id="9" name="TextBox 8">
+            <a:extLst>
+              <a:ext uri="{FF2B5EF4-FFF2-40B4-BE49-F238E27FC236}">
+                <a16:creationId xmlns:a16="http://schemas.microsoft.com/office/drawing/2014/main" id="{AD8D9C75-4B5C-42C3-A0C3-1F628F451567}"/>
+              </a:ext>
+            </a:extLst>
+          </p:cNvPr>
+          <p:cNvSpPr txBox="1"/>
+          <p:nvPr/>
+        </p:nvSpPr>
+        <p:spPr>
+          <a:xfrm>
+            <a:off x="25651650" y="30663813"/>
+            <a:ext cx="6110173" cy="1200329"/>
+          </a:xfrm>
+          <a:prstGeom prst="rect">
+            <a:avLst/>
+          </a:prstGeom>
+          <a:noFill/>
+        </p:spPr>
+        <p:txBody>
+          <a:bodyPr wrap="square" rtlCol="0">
+            <a:spAutoFit/>
+          </a:bodyPr>
+          <a:lstStyle/>
+          <a:p>
+            <a:r>
+              <a:rPr lang="en-US" sz="2400" b="1" i="1" dirty="0">
+                <a:latin typeface="+mn-lt"/>
+                <a:cs typeface="Times New Roman" panose="02020603050405020304" pitchFamily="18" charset="0"/>
+              </a:rPr>
+              <a:t> </a:t>
+            </a:r>
+            <a:r>
+              <a:rPr lang="en-US" sz="2400" b="1" i="1" dirty="0">
+                <a:latin typeface="Times New Roman" panose="02020603050405020304" pitchFamily="18" charset="0"/>
+                <a:cs typeface="Times New Roman" panose="02020603050405020304" pitchFamily="18" charset="0"/>
+              </a:rPr>
+              <a:t>The ‘</a:t>
+            </a:r>
+            <a:r>
+              <a:rPr lang="en-US" sz="2400" b="1" i="1" dirty="0" err="1">
+                <a:latin typeface="Times New Roman" panose="02020603050405020304" pitchFamily="18" charset="0"/>
+                <a:cs typeface="Times New Roman" panose="02020603050405020304" pitchFamily="18" charset="0"/>
+              </a:rPr>
+              <a:t>AdminControl</a:t>
+            </a:r>
+            <a:r>
+              <a:rPr lang="en-US" sz="2400" b="1" i="1" dirty="0">
+                <a:latin typeface="Times New Roman" panose="02020603050405020304" pitchFamily="18" charset="0"/>
+                <a:cs typeface="Times New Roman" panose="02020603050405020304" pitchFamily="18" charset="0"/>
+              </a:rPr>
+              <a:t>’ table stores the status of the gate and sends a value of 1 or 0 to indicate an opening or closing of the barrier.</a:t>
+            </a:r>
           </a:p>
         </p:txBody>
       </p:sp>
       <p:sp>
         <p:nvSpPr>
-          <p:cNvPr id="14353" name="Rectangle 19"/>
-          <p:cNvSpPr>
-            <a:spLocks noChangeArrowheads="1"/>
-          </p:cNvSpPr>
+          <p:cNvPr id="30" name="TextBox 29">
+            <a:extLst>
+              <a:ext uri="{FF2B5EF4-FFF2-40B4-BE49-F238E27FC236}">
+                <a16:creationId xmlns:a16="http://schemas.microsoft.com/office/drawing/2014/main" id="{9F1DB854-0AB0-4B5C-A7AB-E7A3590D28D9}"/>
+              </a:ext>
+            </a:extLst>
+          </p:cNvPr>
+          <p:cNvSpPr txBox="1"/>
           <p:nvPr/>
         </p:nvSpPr>
-        <p:spPr bwMode="auto">
-          <a:xfrm>
-            <a:off x="12192000" y="26276300"/>
-            <a:ext cx="8915400" cy="3598863"/>
-          </a:xfrm>
-          <a:prstGeom prst="rect">
-            <a:avLst/>
-          </a:prstGeom>
-          <a:solidFill>
-            <a:srgbClr val="EEEEEE"/>
-          </a:solidFill>
-          <a:ln w="9525">
-            <a:solidFill>
-              <a:schemeClr val="tx1"/>
-            </a:solidFill>
-            <a:miter lim="800000"/>
-            <a:headEnd/>
-            <a:tailEnd/>
-          </a:ln>
+        <p:spPr>
+          <a:xfrm>
+            <a:off x="23152374" y="23876912"/>
+            <a:ext cx="2346938" cy="430887"/>
+          </a:xfrm>
+          <a:prstGeom prst="rect">
+            <a:avLst/>
+          </a:prstGeom>
+          <a:noFill/>
         </p:spPr>
         <p:txBody>
-          <a:bodyPr wrap="none" anchor="ctr"/>
+          <a:bodyPr wrap="square" rtlCol="0">
+            <a:spAutoFit/>
+          </a:bodyPr>
           <a:lstStyle/>
           <a:p>
-            <a:endParaRPr lang="en-US"/>
+            <a:r>
+              <a:rPr lang="en-US" sz="2200" b="1" i="1" dirty="0">
+                <a:latin typeface="Times New Roman" panose="02020603050405020304" pitchFamily="18" charset="0"/>
+                <a:cs typeface="Times New Roman" panose="02020603050405020304" pitchFamily="18" charset="0"/>
+              </a:rPr>
+              <a:t>‘</a:t>
+            </a:r>
+            <a:r>
+              <a:rPr lang="en-US" sz="2200" b="1" i="1" dirty="0" err="1">
+                <a:latin typeface="Times New Roman" panose="02020603050405020304" pitchFamily="18" charset="0"/>
+                <a:cs typeface="Times New Roman" panose="02020603050405020304" pitchFamily="18" charset="0"/>
+              </a:rPr>
+              <a:t>TestUsers</a:t>
+            </a:r>
+            <a:r>
+              <a:rPr lang="en-US" sz="2200" b="1" i="1" dirty="0">
+                <a:latin typeface="Times New Roman" panose="02020603050405020304" pitchFamily="18" charset="0"/>
+                <a:cs typeface="Times New Roman" panose="02020603050405020304" pitchFamily="18" charset="0"/>
+              </a:rPr>
+              <a:t>’ Table</a:t>
+            </a:r>
           </a:p>
         </p:txBody>
       </p:sp>
       <p:sp>
         <p:nvSpPr>
-          <p:cNvPr id="14355" name="Rectangle 21"/>
-          <p:cNvSpPr>
-            <a:spLocks noChangeArrowheads="1"/>
-          </p:cNvSpPr>
+          <p:cNvPr id="34" name="TextBox 33">
+            <a:extLst>
+              <a:ext uri="{FF2B5EF4-FFF2-40B4-BE49-F238E27FC236}">
+                <a16:creationId xmlns:a16="http://schemas.microsoft.com/office/drawing/2014/main" id="{F51832C4-1707-4B31-BD44-57B11425148F}"/>
+              </a:ext>
+            </a:extLst>
+          </p:cNvPr>
+          <p:cNvSpPr txBox="1"/>
           <p:nvPr/>
         </p:nvSpPr>
-        <p:spPr bwMode="auto">
-          <a:xfrm>
-            <a:off x="12192000" y="17724438"/>
-            <a:ext cx="5399088" cy="3598862"/>
-          </a:xfrm>
-          <a:prstGeom prst="rect">
-            <a:avLst/>
-          </a:prstGeom>
-          <a:solidFill>
-            <a:srgbClr val="EEEEEE"/>
-          </a:solidFill>
-          <a:ln w="9525">
-            <a:solidFill>
-              <a:schemeClr val="tx1"/>
-            </a:solidFill>
-            <a:miter lim="800000"/>
-            <a:headEnd/>
-            <a:tailEnd/>
-          </a:ln>
+        <p:spPr>
+          <a:xfrm>
+            <a:off x="25894334" y="23866873"/>
+            <a:ext cx="2826480" cy="430887"/>
+          </a:xfrm>
+          <a:prstGeom prst="rect">
+            <a:avLst/>
+          </a:prstGeom>
+          <a:noFill/>
         </p:spPr>
         <p:txBody>
-          <a:bodyPr wrap="none" anchor="ctr"/>
+          <a:bodyPr wrap="square" rtlCol="0">
+            <a:spAutoFit/>
+          </a:bodyPr>
           <a:lstStyle/>
           <a:p>
-            <a:endParaRPr lang="en-US"/>
+            <a:r>
+              <a:rPr lang="en-US" sz="2200" b="1" i="1" dirty="0">
+                <a:latin typeface="Times New Roman" panose="02020603050405020304" pitchFamily="18" charset="0"/>
+                <a:cs typeface="Times New Roman" panose="02020603050405020304" pitchFamily="18" charset="0"/>
+              </a:rPr>
+              <a:t>‘</a:t>
+            </a:r>
+            <a:r>
+              <a:rPr lang="en-US" sz="2200" b="1" i="1" dirty="0" err="1">
+                <a:latin typeface="Times New Roman" panose="02020603050405020304" pitchFamily="18" charset="0"/>
+                <a:cs typeface="Times New Roman" panose="02020603050405020304" pitchFamily="18" charset="0"/>
+              </a:rPr>
+              <a:t>ProximityData</a:t>
+            </a:r>
+            <a:r>
+              <a:rPr lang="en-US" sz="2200" b="1" i="1" dirty="0">
+                <a:latin typeface="Times New Roman" panose="02020603050405020304" pitchFamily="18" charset="0"/>
+                <a:cs typeface="Times New Roman" panose="02020603050405020304" pitchFamily="18" charset="0"/>
+              </a:rPr>
+              <a:t>’ Table</a:t>
+            </a:r>
           </a:p>
         </p:txBody>
       </p:sp>
       <p:sp>
         <p:nvSpPr>
-          <p:cNvPr id="14357" name="Rectangle 21"/>
-          <p:cNvSpPr>
-            <a:spLocks noChangeArrowheads="1"/>
-          </p:cNvSpPr>
+          <p:cNvPr id="35" name="TextBox 34">
+            <a:extLst>
+              <a:ext uri="{FF2B5EF4-FFF2-40B4-BE49-F238E27FC236}">
+                <a16:creationId xmlns:a16="http://schemas.microsoft.com/office/drawing/2014/main" id="{F2916759-4BAB-492B-BC92-E23FDD6571DD}"/>
+              </a:ext>
+            </a:extLst>
+          </p:cNvPr>
+          <p:cNvSpPr txBox="1"/>
           <p:nvPr/>
         </p:nvSpPr>
-        <p:spPr bwMode="auto">
-          <a:xfrm>
-            <a:off x="22794913" y="17724438"/>
-            <a:ext cx="5399087" cy="3598862"/>
-          </a:xfrm>
-          <a:prstGeom prst="rect">
-            <a:avLst/>
-          </a:prstGeom>
-          <a:solidFill>
-            <a:srgbClr val="EEEEEE"/>
-          </a:solidFill>
-          <a:ln w="9525">
-            <a:solidFill>
-              <a:schemeClr val="tx1"/>
-            </a:solidFill>
-            <a:miter lim="800000"/>
-            <a:headEnd/>
-            <a:tailEnd/>
-          </a:ln>
+        <p:spPr>
+          <a:xfrm>
+            <a:off x="28720814" y="28072028"/>
+            <a:ext cx="3307795" cy="430887"/>
+          </a:xfrm>
+          <a:prstGeom prst="rect">
+            <a:avLst/>
+          </a:prstGeom>
+          <a:noFill/>
         </p:spPr>
         <p:txBody>
-          <a:bodyPr wrap="none" anchor="ctr"/>
+          <a:bodyPr wrap="square" rtlCol="0">
+            <a:spAutoFit/>
+          </a:bodyPr>
           <a:lstStyle/>
           <a:p>
-            <a:endParaRPr lang="en-US"/>
+            <a:r>
+              <a:rPr lang="en-US" sz="2200" b="1" i="1" dirty="0">
+                <a:latin typeface="Times New Roman" panose="02020603050405020304" pitchFamily="18" charset="0"/>
+                <a:cs typeface="Times New Roman" panose="02020603050405020304" pitchFamily="18" charset="0"/>
+              </a:rPr>
+              <a:t>‘</a:t>
+            </a:r>
+            <a:r>
+              <a:rPr lang="en-US" sz="2200" b="1" i="1" dirty="0" err="1">
+                <a:latin typeface="Times New Roman" panose="02020603050405020304" pitchFamily="18" charset="0"/>
+                <a:cs typeface="Times New Roman" panose="02020603050405020304" pitchFamily="18" charset="0"/>
+              </a:rPr>
+              <a:t>ParkingLocations</a:t>
+            </a:r>
+            <a:r>
+              <a:rPr lang="en-US" sz="2200" b="1" i="1" dirty="0">
+                <a:latin typeface="Times New Roman" panose="02020603050405020304" pitchFamily="18" charset="0"/>
+                <a:cs typeface="Times New Roman" panose="02020603050405020304" pitchFamily="18" charset="0"/>
+              </a:rPr>
+              <a:t>’ Table</a:t>
+            </a:r>
+          </a:p>
+        </p:txBody>
+      </p:sp>
+      <p:sp>
+        <p:nvSpPr>
+          <p:cNvPr id="36" name="TextBox 35">
+            <a:extLst>
+              <a:ext uri="{FF2B5EF4-FFF2-40B4-BE49-F238E27FC236}">
+                <a16:creationId xmlns:a16="http://schemas.microsoft.com/office/drawing/2014/main" id="{B26F0B00-1843-41CC-B4FB-54249534F6C3}"/>
+              </a:ext>
+            </a:extLst>
+          </p:cNvPr>
+          <p:cNvSpPr txBox="1"/>
+          <p:nvPr/>
+        </p:nvSpPr>
+        <p:spPr>
+          <a:xfrm>
+            <a:off x="23204836" y="28114335"/>
+            <a:ext cx="1937037" cy="430887"/>
+          </a:xfrm>
+          <a:prstGeom prst="rect">
+            <a:avLst/>
+          </a:prstGeom>
+          <a:noFill/>
+        </p:spPr>
+        <p:txBody>
+          <a:bodyPr wrap="square" rtlCol="0">
+            <a:spAutoFit/>
+          </a:bodyPr>
+          <a:lstStyle/>
+          <a:p>
+            <a:r>
+              <a:rPr lang="en-US" sz="2200" b="1" i="1" dirty="0">
+                <a:latin typeface="Times New Roman" panose="02020603050405020304" pitchFamily="18" charset="0"/>
+                <a:cs typeface="Times New Roman" panose="02020603050405020304" pitchFamily="18" charset="0"/>
+              </a:rPr>
+              <a:t>‘Orders’ Table</a:t>
+            </a:r>
+          </a:p>
+        </p:txBody>
+      </p:sp>
+      <p:sp>
+        <p:nvSpPr>
+          <p:cNvPr id="39" name="TextBox 38">
+            <a:extLst>
+              <a:ext uri="{FF2B5EF4-FFF2-40B4-BE49-F238E27FC236}">
+                <a16:creationId xmlns:a16="http://schemas.microsoft.com/office/drawing/2014/main" id="{E86BC20A-05F9-4444-AB36-24C05B76A1A5}"/>
+              </a:ext>
+            </a:extLst>
+          </p:cNvPr>
+          <p:cNvSpPr txBox="1"/>
+          <p:nvPr/>
+        </p:nvSpPr>
+        <p:spPr>
+          <a:xfrm>
+            <a:off x="26020109" y="28075808"/>
+            <a:ext cx="2440716" cy="430887"/>
+          </a:xfrm>
+          <a:prstGeom prst="rect">
+            <a:avLst/>
+          </a:prstGeom>
+          <a:noFill/>
+        </p:spPr>
+        <p:txBody>
+          <a:bodyPr wrap="square" rtlCol="0">
+            <a:spAutoFit/>
+          </a:bodyPr>
+          <a:lstStyle/>
+          <a:p>
+            <a:r>
+              <a:rPr lang="en-US" sz="2000" b="1" i="1" dirty="0">
+                <a:latin typeface="Times New Roman" panose="02020603050405020304" pitchFamily="18" charset="0"/>
+                <a:cs typeface="Times New Roman" panose="02020603050405020304" pitchFamily="18" charset="0"/>
+              </a:rPr>
+              <a:t>‘</a:t>
+            </a:r>
+            <a:r>
+              <a:rPr lang="en-US" sz="2200" b="1" i="1" dirty="0" err="1">
+                <a:latin typeface="Times New Roman" panose="02020603050405020304" pitchFamily="18" charset="0"/>
+                <a:cs typeface="Times New Roman" panose="02020603050405020304" pitchFamily="18" charset="0"/>
+              </a:rPr>
+              <a:t>EntryStatus</a:t>
+            </a:r>
+            <a:r>
+              <a:rPr lang="en-US" sz="2200" b="1" i="1" dirty="0">
+                <a:latin typeface="Times New Roman" panose="02020603050405020304" pitchFamily="18" charset="0"/>
+                <a:cs typeface="Times New Roman" panose="02020603050405020304" pitchFamily="18" charset="0"/>
+              </a:rPr>
+              <a:t>’ Table</a:t>
+            </a:r>
+          </a:p>
+        </p:txBody>
+      </p:sp>
+      <p:sp>
+        <p:nvSpPr>
+          <p:cNvPr id="40" name="TextBox 39">
+            <a:extLst>
+              <a:ext uri="{FF2B5EF4-FFF2-40B4-BE49-F238E27FC236}">
+                <a16:creationId xmlns:a16="http://schemas.microsoft.com/office/drawing/2014/main" id="{117F632E-4D05-457D-91D1-6AD7B57F36F4}"/>
+              </a:ext>
+            </a:extLst>
+          </p:cNvPr>
+          <p:cNvSpPr txBox="1"/>
+          <p:nvPr/>
+        </p:nvSpPr>
+        <p:spPr>
+          <a:xfrm>
+            <a:off x="29476547" y="23866873"/>
+            <a:ext cx="1608786" cy="430887"/>
+          </a:xfrm>
+          <a:prstGeom prst="rect">
+            <a:avLst/>
+          </a:prstGeom>
+          <a:noFill/>
+        </p:spPr>
+        <p:txBody>
+          <a:bodyPr wrap="square" rtlCol="0">
+            <a:spAutoFit/>
+          </a:bodyPr>
+          <a:lstStyle/>
+          <a:p>
+            <a:r>
+              <a:rPr lang="en-US" sz="2200" b="1" i="1" dirty="0">
+                <a:latin typeface="Times New Roman" panose="02020603050405020304" pitchFamily="18" charset="0"/>
+                <a:cs typeface="Times New Roman" panose="02020603050405020304" pitchFamily="18" charset="0"/>
+              </a:rPr>
+              <a:t>‘Cars‘ Table</a:t>
+            </a:r>
+          </a:p>
+        </p:txBody>
+      </p:sp>
+      <p:sp>
+        <p:nvSpPr>
+          <p:cNvPr id="42" name="TextBox 41">
+            <a:extLst>
+              <a:ext uri="{FF2B5EF4-FFF2-40B4-BE49-F238E27FC236}">
+                <a16:creationId xmlns:a16="http://schemas.microsoft.com/office/drawing/2014/main" id="{5883174B-E868-4E83-8994-E976F25A2D56}"/>
+              </a:ext>
+            </a:extLst>
+          </p:cNvPr>
+          <p:cNvSpPr txBox="1"/>
+          <p:nvPr/>
+        </p:nvSpPr>
+        <p:spPr>
+          <a:xfrm>
+            <a:off x="26035625" y="26712500"/>
+            <a:ext cx="2323485" cy="430887"/>
+          </a:xfrm>
+          <a:prstGeom prst="rect">
+            <a:avLst/>
+          </a:prstGeom>
+          <a:noFill/>
+        </p:spPr>
+        <p:txBody>
+          <a:bodyPr wrap="square" rtlCol="0">
+            <a:spAutoFit/>
+          </a:bodyPr>
+          <a:lstStyle/>
+          <a:p>
+            <a:r>
+              <a:rPr lang="en-US" sz="2200" i="1" dirty="0">
+                <a:latin typeface="Times New Roman" panose="02020603050405020304" pitchFamily="18" charset="0"/>
+                <a:cs typeface="Times New Roman" panose="02020603050405020304" pitchFamily="18" charset="0"/>
+              </a:rPr>
+              <a:t>‘</a:t>
+            </a:r>
+            <a:r>
+              <a:rPr lang="en-US" sz="2200" b="1" i="1" dirty="0" err="1">
+                <a:latin typeface="Times New Roman" panose="02020603050405020304" pitchFamily="18" charset="0"/>
+                <a:cs typeface="Times New Roman" panose="02020603050405020304" pitchFamily="18" charset="0"/>
+              </a:rPr>
+              <a:t>GateStatus</a:t>
+            </a:r>
+            <a:r>
+              <a:rPr lang="en-US" sz="2200" b="1" i="1" dirty="0">
+                <a:latin typeface="Times New Roman" panose="02020603050405020304" pitchFamily="18" charset="0"/>
+                <a:cs typeface="Times New Roman" panose="02020603050405020304" pitchFamily="18" charset="0"/>
+              </a:rPr>
+              <a:t>’ Table</a:t>
+            </a:r>
+          </a:p>
+        </p:txBody>
+      </p:sp>
+      <p:sp>
+        <p:nvSpPr>
+          <p:cNvPr id="2" name="TextBox 1">
+            <a:extLst>
+              <a:ext uri="{FF2B5EF4-FFF2-40B4-BE49-F238E27FC236}">
+                <a16:creationId xmlns:a16="http://schemas.microsoft.com/office/drawing/2014/main" id="{2390873E-2E98-42FF-A623-A5A91F21CF03}"/>
+              </a:ext>
+            </a:extLst>
+          </p:cNvPr>
+          <p:cNvSpPr txBox="1"/>
+          <p:nvPr/>
+        </p:nvSpPr>
+        <p:spPr>
+          <a:xfrm flipH="1">
+            <a:off x="5514010" y="22191412"/>
+            <a:ext cx="3810001" cy="430887"/>
+          </a:xfrm>
+          <a:prstGeom prst="rect">
+            <a:avLst/>
+          </a:prstGeom>
+          <a:noFill/>
+        </p:spPr>
+        <p:txBody>
+          <a:bodyPr wrap="square" rtlCol="0">
+            <a:spAutoFit/>
+          </a:bodyPr>
+          <a:lstStyle/>
+          <a:p>
+            <a:r>
+              <a:rPr lang="en-US" sz="2200" b="1" dirty="0">
+                <a:solidFill>
+                  <a:schemeClr val="accent1">
+                    <a:lumMod val="90000"/>
+                    <a:lumOff val="10000"/>
+                  </a:schemeClr>
+                </a:solidFill>
+              </a:rPr>
+              <a:t>Total Project Cost: $261.79</a:t>
+            </a:r>
+          </a:p>
+        </p:txBody>
+      </p:sp>
+      <p:sp>
+        <p:nvSpPr>
+          <p:cNvPr id="8" name="TextBox 7">
+            <a:extLst>
+              <a:ext uri="{FF2B5EF4-FFF2-40B4-BE49-F238E27FC236}">
+                <a16:creationId xmlns:a16="http://schemas.microsoft.com/office/drawing/2014/main" id="{0A220D8B-B53F-4444-B364-1690649C5A02}"/>
+              </a:ext>
+            </a:extLst>
+          </p:cNvPr>
+          <p:cNvSpPr txBox="1"/>
+          <p:nvPr/>
+        </p:nvSpPr>
+        <p:spPr>
+          <a:xfrm>
+            <a:off x="22605373" y="7402745"/>
+            <a:ext cx="9515709" cy="1692771"/>
+          </a:xfrm>
+          <a:prstGeom prst="rect">
+            <a:avLst/>
+          </a:prstGeom>
+          <a:noFill/>
+        </p:spPr>
+        <p:txBody>
+          <a:bodyPr wrap="square" rtlCol="0">
+            <a:spAutoFit/>
+          </a:bodyPr>
+          <a:lstStyle/>
+          <a:p>
+            <a:r>
+              <a:rPr lang="en-US" sz="2000" b="1" dirty="0"/>
+              <a:t>The mobile application works alongside an online database structure through the Firebase database and on-site devices which include the VCNL4010 Proximity sensor, IR Break Beam Sensor, and the 2 servo motors running alongside the PCA9685 servo controller. </a:t>
+            </a:r>
+          </a:p>
+          <a:p>
+            <a:endParaRPr lang="en-US" sz="2400" dirty="0"/>
+          </a:p>
+        </p:txBody>
+      </p:sp>
+      <p:sp>
+        <p:nvSpPr>
+          <p:cNvPr id="45" name="TextBox 44">
+            <a:extLst>
+              <a:ext uri="{FF2B5EF4-FFF2-40B4-BE49-F238E27FC236}">
+                <a16:creationId xmlns:a16="http://schemas.microsoft.com/office/drawing/2014/main" id="{B6E4D93A-1CC5-4331-B221-EFA36DB75F95}"/>
+              </a:ext>
+            </a:extLst>
+          </p:cNvPr>
+          <p:cNvSpPr txBox="1"/>
+          <p:nvPr/>
+        </p:nvSpPr>
+        <p:spPr>
+          <a:xfrm>
+            <a:off x="22619368" y="6932874"/>
+            <a:ext cx="10412879" cy="769441"/>
+          </a:xfrm>
+          <a:prstGeom prst="rect">
+            <a:avLst/>
+          </a:prstGeom>
+          <a:noFill/>
+        </p:spPr>
+        <p:txBody>
+          <a:bodyPr wrap="square" rtlCol="0">
+            <a:spAutoFit/>
+          </a:bodyPr>
+          <a:lstStyle/>
+          <a:p>
+            <a:r>
+              <a:rPr lang="en-US" sz="2000" b="1" dirty="0">
+                <a:solidFill>
+                  <a:schemeClr val="accent2"/>
+                </a:solidFill>
+                <a:effectLst>
+                  <a:outerShdw blurRad="38100" dist="38100" dir="2700000" algn="tl">
+                    <a:srgbClr val="000000">
+                      <a:alpha val="43137"/>
+                    </a:srgbClr>
+                  </a:outerShdw>
+                </a:effectLst>
+              </a:rPr>
+              <a:t>Development Environment: Android Studio (JAVA) – API 21 and above </a:t>
+            </a:r>
+          </a:p>
+          <a:p>
+            <a:endParaRPr lang="en-US" sz="2400" dirty="0"/>
+          </a:p>
+        </p:txBody>
+      </p:sp>
+      <p:sp>
+        <p:nvSpPr>
+          <p:cNvPr id="51" name="TextBox 50">
+            <a:extLst>
+              <a:ext uri="{FF2B5EF4-FFF2-40B4-BE49-F238E27FC236}">
+                <a16:creationId xmlns:a16="http://schemas.microsoft.com/office/drawing/2014/main" id="{B83E8DE8-B0D2-4928-ACBE-B1D843BF3939}"/>
+              </a:ext>
+            </a:extLst>
+          </p:cNvPr>
+          <p:cNvSpPr txBox="1"/>
+          <p:nvPr/>
+        </p:nvSpPr>
+        <p:spPr>
+          <a:xfrm>
+            <a:off x="22619368" y="8801756"/>
+            <a:ext cx="9160159" cy="3785652"/>
+          </a:xfrm>
+          <a:prstGeom prst="rect">
+            <a:avLst/>
+          </a:prstGeom>
+          <a:noFill/>
+        </p:spPr>
+        <p:txBody>
+          <a:bodyPr wrap="square" rtlCol="0">
+            <a:spAutoFit/>
+          </a:bodyPr>
+          <a:lstStyle/>
+          <a:p>
+            <a:pPr>
+              <a:spcBef>
+                <a:spcPct val="50000"/>
+              </a:spcBef>
+            </a:pPr>
+            <a:r>
+              <a:rPr lang="en-US" sz="2000" b="1" dirty="0"/>
+              <a:t>The application follows a login and authentication structure and is designed with various screens in mind to support our consumer application. This includes options to add a car, manage added cars, view real-time parking lot data and provide status updates/changes through the supporting sensors/effectors and the data sent and retrieved by the online database. Other features include consumer abilities to reserve a spot in a parking lot, select a parking pass, payment services and ability to view order history/transactions. As well as access settings, customize language preferences and other in-app options. </a:t>
+            </a:r>
+          </a:p>
+          <a:p>
+            <a:pPr>
+              <a:spcBef>
+                <a:spcPct val="50000"/>
+              </a:spcBef>
+            </a:pPr>
+            <a:endParaRPr lang="en-US" sz="2400" b="1" dirty="0">
+              <a:solidFill>
+                <a:schemeClr val="accent1">
+                  <a:lumMod val="90000"/>
+                  <a:lumOff val="10000"/>
+                </a:schemeClr>
+              </a:solidFill>
+              <a:effectLst>
+                <a:outerShdw blurRad="38100" dist="38100" dir="2700000" algn="tl">
+                  <a:srgbClr val="000000">
+                    <a:alpha val="43137"/>
+                  </a:srgbClr>
+                </a:outerShdw>
+              </a:effectLst>
+            </a:endParaRPr>
+          </a:p>
+          <a:p>
+            <a:endParaRPr lang="en-US" sz="2400" dirty="0"/>
+          </a:p>
+        </p:txBody>
+      </p:sp>
+      <p:sp>
+        <p:nvSpPr>
+          <p:cNvPr id="52" name="TextBox 51">
+            <a:extLst>
+              <a:ext uri="{FF2B5EF4-FFF2-40B4-BE49-F238E27FC236}">
+                <a16:creationId xmlns:a16="http://schemas.microsoft.com/office/drawing/2014/main" id="{5CAB1C6D-299F-422A-8459-FA28260B5E45}"/>
+              </a:ext>
+            </a:extLst>
+          </p:cNvPr>
+          <p:cNvSpPr txBox="1"/>
+          <p:nvPr/>
+        </p:nvSpPr>
+        <p:spPr>
+          <a:xfrm>
+            <a:off x="22549720" y="16984862"/>
+            <a:ext cx="9515709" cy="2923877"/>
+          </a:xfrm>
+          <a:prstGeom prst="rect">
+            <a:avLst/>
+          </a:prstGeom>
+          <a:noFill/>
+        </p:spPr>
+        <p:txBody>
+          <a:bodyPr wrap="square" rtlCol="0">
+            <a:spAutoFit/>
+          </a:bodyPr>
+          <a:lstStyle/>
+          <a:p>
+            <a:r>
+              <a:rPr lang="en-US" sz="2000" b="1" dirty="0"/>
+              <a:t>The online database is configured based on essential criteria needed to access the mobile application, hardware and vice-versa. The main source of delegating data is done through the Google Firebase database.</a:t>
+            </a:r>
+          </a:p>
+          <a:p>
+            <a:r>
+              <a:rPr lang="en-US" sz="2000" b="1" dirty="0"/>
+              <a:t>There are five main data structures used in the project, along with four sub-siding tables used for the purpose of the mobile application, and other intended functionality of our parking application. SQL scripts are used with Firebase/</a:t>
+            </a:r>
+            <a:r>
+              <a:rPr lang="en-US" sz="2000" b="1" dirty="0" err="1"/>
+              <a:t>Pyrebase</a:t>
+            </a:r>
+            <a:r>
+              <a:rPr lang="en-US" sz="2000" b="1" dirty="0"/>
+              <a:t> , to gain access to the Firebase API using the API key for both the mobile application and parking lot prototype. </a:t>
+            </a:r>
+          </a:p>
+          <a:p>
+            <a:endParaRPr lang="en-US" sz="2400" dirty="0"/>
+          </a:p>
+        </p:txBody>
+      </p:sp>
+      <p:sp>
+        <p:nvSpPr>
+          <p:cNvPr id="53" name="TextBox 52">
+            <a:extLst>
+              <a:ext uri="{FF2B5EF4-FFF2-40B4-BE49-F238E27FC236}">
+                <a16:creationId xmlns:a16="http://schemas.microsoft.com/office/drawing/2014/main" id="{B353F868-F83A-4473-A583-EDD4FB61580E}"/>
+              </a:ext>
+            </a:extLst>
+          </p:cNvPr>
+          <p:cNvSpPr txBox="1"/>
+          <p:nvPr/>
+        </p:nvSpPr>
+        <p:spPr>
+          <a:xfrm>
+            <a:off x="22558098" y="19516741"/>
+            <a:ext cx="9515709" cy="1384995"/>
+          </a:xfrm>
+          <a:prstGeom prst="rect">
+            <a:avLst/>
+          </a:prstGeom>
+          <a:noFill/>
+        </p:spPr>
+        <p:txBody>
+          <a:bodyPr wrap="square" rtlCol="0">
+            <a:spAutoFit/>
+          </a:bodyPr>
+          <a:lstStyle/>
+          <a:p>
+            <a:r>
+              <a:rPr lang="en-US" sz="2000" b="1" dirty="0"/>
+              <a:t>The ‘</a:t>
+            </a:r>
+            <a:r>
+              <a:rPr lang="en-US" sz="2000" b="1" dirty="0" err="1"/>
+              <a:t>TestUsers</a:t>
+            </a:r>
+            <a:r>
+              <a:rPr lang="en-US" sz="2000" b="1" dirty="0"/>
+              <a:t>’ data structure stores registration details specific to the user. The UID (user ID) acts as the primary key identifying each existing user and its registered account information.</a:t>
+            </a:r>
+          </a:p>
+          <a:p>
+            <a:endParaRPr lang="en-US" sz="2400" dirty="0"/>
           </a:p>
         </p:txBody>
       </p:sp>

</xml_diff>

<commit_message>
new poster update (added in conclusion,references)
</commit_message>
<xml_diff>
--- a/documentation/WatechParkPoster(WIP).pptx
+++ b/documentation/WatechParkPoster(WIP).pptx
@@ -4151,7 +4151,7 @@
               </a:spcBef>
             </a:pPr>
             <a:r>
-              <a:rPr lang="en-GB" sz="4000" b="1" u="sng" dirty="0">
+              <a:rPr lang="en-GB" sz="2000" b="1" u="sng" dirty="0">
                 <a:solidFill>
                   <a:schemeClr val="tx2"/>
                 </a:solidFill>
@@ -4165,7 +4165,7 @@
               </a:rPr>
               <a:t>ACKNOWLEDGEMENTS</a:t>
             </a:r>
-            <a:endParaRPr lang="en-GB" sz="4000" b="1" dirty="0">
+            <a:endParaRPr lang="en-GB" sz="2000" b="1" dirty="0">
               <a:solidFill>
                 <a:srgbClr val="CC3300"/>
               </a:solidFill>
@@ -4179,7 +4179,7 @@
             </a:endParaRPr>
           </a:p>
           <a:p>
-            <a:endParaRPr lang="en-US" sz="2800" dirty="0">
+            <a:endParaRPr lang="en-US" sz="2000" dirty="0">
               <a:effectLst>
                 <a:outerShdw blurRad="38100" dist="38100" dir="2700000" algn="tl">
                   <a:srgbClr val="000000">
@@ -4208,6 +4208,72 @@
               </a:rPr>
               <a:t>References:</a:t>
             </a:r>
+          </a:p>
+          <a:p>
+            <a:r>
+              <a:rPr lang="en-US" sz="2000" b="1" dirty="0"/>
+              <a:t>Park Indigo Canada Inc. (2019). Indigo. Retrieved from </a:t>
+            </a:r>
+            <a:r>
+              <a:rPr lang="en-US" sz="2000" b="1" dirty="0">
+                <a:hlinkClick r:id="rId2"/>
+              </a:rPr>
+              <a:t>https://ca.parkindigo.com/en</a:t>
+            </a:r>
+            <a:endParaRPr lang="en-US" sz="2000" b="1" dirty="0"/>
+          </a:p>
+          <a:p>
+            <a:endParaRPr lang="en-US" sz="2000" b="1" dirty="0"/>
+          </a:p>
+          <a:p>
+            <a:r>
+              <a:rPr lang="en-US" sz="2000" b="1" dirty="0" err="1"/>
+              <a:t>ParkWhiz</a:t>
+            </a:r>
+            <a:r>
+              <a:rPr lang="en-US" sz="2000" b="1" dirty="0"/>
+              <a:t>. (2019). Find and Book Parking Anywhere. Retrieved from </a:t>
+            </a:r>
+            <a:r>
+              <a:rPr lang="en-US" sz="2000" b="1" dirty="0">
+                <a:hlinkClick r:id="rId3"/>
+              </a:rPr>
+              <a:t>https://www.bestparking.com/</a:t>
+            </a:r>
+            <a:endParaRPr lang="en-US" sz="2000" b="1" dirty="0"/>
+          </a:p>
+          <a:p>
+            <a:endParaRPr lang="en-US" sz="2000" b="1" dirty="0"/>
+          </a:p>
+          <a:p>
+            <a:r>
+              <a:rPr lang="en-US" sz="2000" b="1" i="1" dirty="0" err="1"/>
+              <a:t>EasyPark</a:t>
+            </a:r>
+            <a:r>
+              <a:rPr lang="en-US" sz="2000" b="1" dirty="0"/>
+              <a:t>. (2016). Retrieved from </a:t>
+            </a:r>
+            <a:r>
+              <a:rPr lang="en-US" sz="2000" b="1" dirty="0" err="1"/>
+              <a:t>EasyPark</a:t>
+            </a:r>
+            <a:r>
+              <a:rPr lang="en-US" sz="2000" b="1" dirty="0"/>
+              <a:t> Mobile Parking App: </a:t>
+            </a:r>
+            <a:r>
+              <a:rPr lang="en-US" sz="2000" b="1" dirty="0">
+                <a:hlinkClick r:id="rId4"/>
+              </a:rPr>
+              <a:t>https://www.easypark.ca/products-services/mobile-parking-app</a:t>
+            </a:r>
+            <a:endParaRPr lang="en-US" sz="2000" b="1" dirty="0"/>
+          </a:p>
+          <a:p>
+            <a:endParaRPr lang="en-US" sz="2000" b="1" dirty="0"/>
+          </a:p>
+          <a:p>
             <a:endParaRPr lang="en-US" sz="3200" dirty="0">
               <a:solidFill>
                 <a:schemeClr val="accent1">
@@ -4497,7 +4563,7 @@
                   </a:outerShdw>
                 </a:effectLst>
               </a:rPr>
-              <a:t>  </a:t>
+              <a:t> </a:t>
             </a:r>
             <a:r>
               <a:rPr lang="en-US" sz="2000" b="1" dirty="0"/>
@@ -4516,29 +4582,25 @@
             </a:r>
           </a:p>
           <a:p>
-            <a:pPr marL="342900" indent="-342900">
+            <a:pPr>
               <a:spcBef>
                 <a:spcPts val="0"/>
               </a:spcBef>
-              <a:buFontTx/>
-              <a:buChar char="-"/>
             </a:pPr>
             <a:r>
               <a:rPr lang="en-US" sz="2000" b="1" dirty="0"/>
-              <a:t>PCA9685 Servo Controller</a:t>
-            </a:r>
-          </a:p>
-          <a:p>
-            <a:pPr marL="342900" indent="-342900">
+              <a:t>-   PCA9685 Servo Controller</a:t>
+            </a:r>
+          </a:p>
+          <a:p>
+            <a:pPr>
               <a:spcBef>
                 <a:spcPts val="0"/>
               </a:spcBef>
-              <a:buFontTx/>
-              <a:buChar char="-"/>
             </a:pPr>
             <a:r>
               <a:rPr lang="en-US" sz="2000" b="1" dirty="0"/>
-              <a:t>2 Micro Servo Motors(entry/exit gate control)</a:t>
+              <a:t>-   2 Micro Servo Motors(entry/exit gate control)</a:t>
             </a:r>
           </a:p>
           <a:p>
@@ -4582,25 +4644,6 @@
                 <a:spcPts val="0"/>
               </a:spcBef>
             </a:pPr>
-            <a:endParaRPr lang="en-US" sz="2400" b="1" dirty="0">
-              <a:solidFill>
-                <a:srgbClr val="052754"/>
-              </a:solidFill>
-              <a:effectLst>
-                <a:outerShdw blurRad="38100" dist="38100" dir="2700000" algn="tl">
-                  <a:srgbClr val="000000">
-                    <a:alpha val="43137"/>
-                  </a:srgbClr>
-                </a:outerShdw>
-              </a:effectLst>
-            </a:endParaRPr>
-          </a:p>
-          <a:p>
-            <a:pPr>
-              <a:spcBef>
-                <a:spcPts val="0"/>
-              </a:spcBef>
-            </a:pPr>
             <a:r>
               <a:rPr lang="en-US" sz="2400" b="1" dirty="0">
                 <a:solidFill>
@@ -4623,28 +4666,9 @@
                 <a:spcPts val="0"/>
               </a:spcBef>
             </a:pPr>
-            <a:endParaRPr lang="en-US" sz="2400" b="1" dirty="0">
-              <a:solidFill>
-                <a:srgbClr val="052754"/>
-              </a:solidFill>
-              <a:effectLst>
-                <a:outerShdw blurRad="38100" dist="38100" dir="2700000" algn="tl">
-                  <a:srgbClr val="000000">
-                    <a:alpha val="43137"/>
-                  </a:srgbClr>
-                </a:outerShdw>
-              </a:effectLst>
-            </a:endParaRPr>
-          </a:p>
-          <a:p>
-            <a:pPr>
-              <a:spcBef>
-                <a:spcPts val="0"/>
-              </a:spcBef>
-            </a:pPr>
             <a:r>
               <a:rPr lang="en-US" sz="2000" b="1" dirty="0"/>
-              <a:t>The prototype lab in Humber College is the main source of providing the services to etch the PCB board during its final stages of production. Adjustments were made to hardware designs/parts along with the help of Vlad and Kelly whom were present to help.</a:t>
+              <a:t>The prototype lab in Humber College is the main source of providing the services to etch the PCB board during its final stages of production as well as provide laser-cutting services initially planned. The electronics lab facility also allowed our team to work on the project, for both hardware/software purposes. Adjustments were made to hardware designs/parts along with the help of Vlad and Kelly whom were present to help.</a:t>
             </a:r>
           </a:p>
           <a:p>
@@ -5147,13 +5171,6 @@
             </a:r>
           </a:p>
           <a:p>
-            <a:endParaRPr lang="en-US" sz="4000" b="1" dirty="0">
-              <a:solidFill>
-                <a:srgbClr val="052754"/>
-              </a:solidFill>
-            </a:endParaRPr>
-          </a:p>
-          <a:p>
             <a:pPr marL="381000" indent="-381000"/>
             <a:endParaRPr lang="en-US" sz="2000" b="1" dirty="0">
               <a:solidFill>
@@ -6300,8 +6317,6 @@
               </a:rPr>
               <a:t>PRINTING</a:t>
             </a:r>
-          </a:p>
-          <a:p>
             <a:endParaRPr lang="en-US" sz="3200" dirty="0">
               <a:effectLst>
                 <a:outerShdw blurRad="38100" dist="38100" dir="2700000" algn="tl">
@@ -6314,7 +6329,7 @@
           </a:p>
           <a:p>
             <a:r>
-              <a:rPr lang="en-US" sz="3200" b="1" dirty="0">
+              <a:rPr lang="en-US" sz="3200" b="1" u="sng" dirty="0">
                 <a:solidFill>
                   <a:schemeClr val="accent1">
                     <a:lumMod val="90000"/>
@@ -6329,24 +6344,58 @@
                   </a:outerShdw>
                 </a:effectLst>
               </a:rPr>
-              <a:t>Enclosure:</a:t>
-            </a:r>
-          </a:p>
-          <a:p>
-            <a:endParaRPr lang="en-US" sz="3200" dirty="0">
+              <a:t>Enclosure/Prototype:</a:t>
+            </a:r>
+          </a:p>
+          <a:p>
+            <a:r>
+              <a:rPr lang="en-US" sz="2000" b="1" dirty="0">
+                <a:solidFill>
+                  <a:schemeClr val="accent1">
+                    <a:lumMod val="90000"/>
+                    <a:lumOff val="10000"/>
+                  </a:schemeClr>
+                </a:solidFill>
+              </a:rPr>
+              <a:t>The enclosure would have been set to have a parking lot prototype along with the Raspberry Pi/PCB attached to the center of the entrance and exit. This design would have been used to house the Raspberry Pi platform/PCB components, serving as solid protection from any outside harm and ensuring the safety of the project assembled. The following visuals below, showcase the end design of the SMART parking lot prototype and the final enclosure to hold the Raspberry Pi/PCB unit . </a:t>
+            </a:r>
+            <a:endParaRPr lang="en-US" sz="2000" dirty="0">
               <a:solidFill>
                 <a:schemeClr val="accent1">
                   <a:lumMod val="90000"/>
                   <a:lumOff val="10000"/>
                 </a:schemeClr>
               </a:solidFill>
-              <a:effectLst>
-                <a:outerShdw blurRad="38100" dist="38100" dir="2700000" algn="tl">
-                  <a:srgbClr val="000000">
-                    <a:alpha val="43137"/>
-                  </a:srgbClr>
-                </a:outerShdw>
-              </a:effectLst>
+            </a:endParaRPr>
+          </a:p>
+          <a:p>
+            <a:endParaRPr lang="en-US" sz="2000" dirty="0">
+              <a:solidFill>
+                <a:schemeClr val="accent1">
+                  <a:lumMod val="90000"/>
+                  <a:lumOff val="10000"/>
+                </a:schemeClr>
+              </a:solidFill>
+            </a:endParaRPr>
+          </a:p>
+          <a:p>
+            <a:endParaRPr lang="en-US" sz="2000" dirty="0">
+              <a:solidFill>
+                <a:schemeClr val="accent1">
+                  <a:lumMod val="90000"/>
+                  <a:lumOff val="10000"/>
+                </a:schemeClr>
+              </a:solidFill>
+            </a:endParaRPr>
+          </a:p>
+          <a:p>
+            <a:endParaRPr lang="en-US" sz="2000" dirty="0">
+              <a:solidFill>
+                <a:schemeClr val="accent1">
+                  <a:lumMod val="90000"/>
+                  <a:lumOff val="10000"/>
+                </a:schemeClr>
+              </a:solidFill>
             </a:endParaRPr>
           </a:p>
           <a:p>
@@ -6367,26 +6416,6 @@
             </a:endParaRPr>
           </a:p>
           <a:p>
-            <a:r>
-              <a:rPr lang="en-US" sz="3200" b="1" dirty="0">
-                <a:solidFill>
-                  <a:schemeClr val="accent1">
-                    <a:lumMod val="90000"/>
-                    <a:lumOff val="10000"/>
-                  </a:schemeClr>
-                </a:solidFill>
-                <a:effectLst>
-                  <a:outerShdw blurRad="38100" dist="38100" dir="2700000" algn="tl">
-                    <a:srgbClr val="000000">
-                      <a:alpha val="43137"/>
-                    </a:srgbClr>
-                  </a:outerShdw>
-                </a:effectLst>
-              </a:rPr>
-              <a:t>Unit Testing:(not set)</a:t>
-            </a:r>
-          </a:p>
-          <a:p>
             <a:endParaRPr lang="en-US" sz="3200" b="1" dirty="0">
               <a:solidFill>
                 <a:schemeClr val="accent1">
@@ -6404,7 +6433,28 @@
             </a:endParaRPr>
           </a:p>
           <a:p>
-            <a:endParaRPr lang="en-US" sz="3200" b="1" dirty="0">
+            <a:endParaRPr lang="en-US" sz="2000" b="1" dirty="0">
+              <a:solidFill>
+                <a:schemeClr val="accent1">
+                  <a:lumMod val="90000"/>
+                  <a:lumOff val="10000"/>
+                </a:schemeClr>
+              </a:solidFill>
+            </a:endParaRPr>
+          </a:p>
+          <a:p>
+            <a:r>
+              <a:rPr lang="en-US" sz="2000" b="1" dirty="0">
+                <a:solidFill>
+                  <a:schemeClr val="accent1">
+                    <a:lumMod val="90000"/>
+                    <a:lumOff val="10000"/>
+                  </a:schemeClr>
+                </a:solidFill>
+              </a:rPr>
+              <a:t>As shown above, between the entrance and exit there is available space for the Raspberry Pi and the sensors attached. The sensors/effectors would go through under the parking lot and connect back to the space allotted. The IR Break-Beam sensors are connected to the entry and exit. The VCNL4010 proximity sensor is located at Slot 1A, which would be connected through a wall and attached facing the parking spot to detect the presence of a car approaching the spot. The camera would have been attached to a bar over the entry to scan the license plate on top of the car. The enclosure was designed using the CorelDraw software. The enclosure would clip onto the SMART parking lot model and hold the PCB in place with the Raspberry Pi platform.</a:t>
+            </a:r>
+            <a:endParaRPr lang="en-US" sz="2000" b="1" dirty="0">
               <a:solidFill>
                 <a:schemeClr val="accent1">
                   <a:lumMod val="90000"/>
@@ -6419,69 +6469,6 @@
                 </a:outerShdw>
               </a:effectLst>
             </a:endParaRPr>
-          </a:p>
-          <a:p>
-            <a:r>
-              <a:rPr lang="en-US" sz="3200" b="1" dirty="0">
-                <a:solidFill>
-                  <a:schemeClr val="accent1">
-                    <a:lumMod val="90000"/>
-                    <a:lumOff val="10000"/>
-                  </a:schemeClr>
-                </a:solidFill>
-                <a:effectLst>
-                  <a:outerShdw blurRad="38100" dist="38100" dir="2700000" algn="tl">
-                    <a:srgbClr val="000000">
-                      <a:alpha val="43137"/>
-                    </a:srgbClr>
-                  </a:outerShdw>
-                </a:effectLst>
-              </a:rPr>
-              <a:t>Production Testing</a:t>
-            </a:r>
-            <a:r>
-              <a:rPr lang="en-US" sz="3200" b="1" dirty="0"/>
-              <a:t>: </a:t>
-            </a:r>
-            <a:r>
-              <a:rPr lang="en-US" sz="3200" b="1" dirty="0">
-                <a:solidFill>
-                  <a:schemeClr val="accent1">
-                    <a:lumMod val="90000"/>
-                    <a:lumOff val="10000"/>
-                  </a:schemeClr>
-                </a:solidFill>
-                <a:effectLst>
-                  <a:outerShdw blurRad="38100" dist="38100" dir="2700000" algn="tl">
-                    <a:srgbClr val="000000">
-                      <a:alpha val="43137"/>
-                    </a:srgbClr>
-                  </a:outerShdw>
-                </a:effectLst>
-              </a:rPr>
-              <a:t>(not set</a:t>
-            </a:r>
-            <a:r>
-              <a:rPr lang="en-US" sz="2800" b="1" dirty="0">
-                <a:solidFill>
-                  <a:schemeClr val="accent1">
-                    <a:lumMod val="90000"/>
-                    <a:lumOff val="10000"/>
-                  </a:schemeClr>
-                </a:solidFill>
-                <a:effectLst>
-                  <a:outerShdw blurRad="38100" dist="38100" dir="2700000" algn="tl">
-                    <a:srgbClr val="000000">
-                      <a:alpha val="43137"/>
-                    </a:srgbClr>
-                  </a:outerShdw>
-                </a:effectLst>
-              </a:rPr>
-              <a:t>)</a:t>
-            </a:r>
-          </a:p>
-          <a:p>
-            <a:endParaRPr lang="en-US" sz="2800" dirty="0"/>
           </a:p>
         </p:txBody>
       </p:sp>
@@ -6546,17 +6533,6 @@
             </a:r>
           </a:p>
           <a:p>
-            <a:endParaRPr lang="en-US" sz="2800" dirty="0">
-              <a:effectLst>
-                <a:outerShdw blurRad="38100" dist="38100" dir="2700000" algn="tl">
-                  <a:srgbClr val="000000">
-                    <a:alpha val="43137"/>
-                  </a:srgbClr>
-                </a:outerShdw>
-              </a:effectLst>
-            </a:endParaRPr>
-          </a:p>
-          <a:p>
             <a:r>
               <a:rPr lang="en-US" sz="3200" b="1" dirty="0">
                 <a:solidFill>
@@ -6575,7 +6551,22 @@
               </a:rPr>
               <a:t>Next Steps:</a:t>
             </a:r>
-            <a:endParaRPr lang="en-US" sz="3200" dirty="0">
+          </a:p>
+          <a:p>
+            <a:r>
+              <a:rPr lang="en-US" sz="2000" b="1" dirty="0">
+                <a:solidFill>
+                  <a:schemeClr val="accent1">
+                    <a:lumMod val="90000"/>
+                    <a:lumOff val="10000"/>
+                  </a:schemeClr>
+                </a:solidFill>
+              </a:rPr>
+              <a:t>Future steps may include, a more compact PCB design to accompany the use of the two servo motors. Thus, reducing the overall footprint size of the project by a smaller, more considerable approach and allowing more room for improvement in terms of hardware use/capabilities. Other possible additions, may include adding further support for each available parking spot on our prototype model. This would require the use of a I2C multiplexer to allow individual VCNL4010 proximity sensors to be positioned at each parking space, rather than the current single VCNL4010 device. We had initially planned to utilize all four parking spots on the prototype, although due to hardware constraints and time limitations in the end the product was only capable to support one parking space. We believe this would add more capabilities for the consumer, with full functionality in terms of the prototype, rather than simulation as is currently of the other three slots. Additionally, support for the Android mobile application can include future modifications to allow room for a full ‘admin’ login mode as initially planned, providing the admin user the ability to view advanced metrics/ live data.</a:t>
+            </a:r>
+          </a:p>
+          <a:p>
+            <a:endParaRPr lang="en-US" sz="2800" b="1" dirty="0">
               <a:solidFill>
                 <a:schemeClr val="accent1">
                   <a:lumMod val="90000"/>
@@ -6608,7 +6599,7 @@
           <p:nvPr/>
         </p:nvPicPr>
         <p:blipFill>
-          <a:blip r:embed="rId2"/>
+          <a:blip r:embed="rId5"/>
           <a:stretch>
             <a:fillRect/>
           </a:stretch>
@@ -6674,7 +6665,7 @@
           <p:nvPr/>
         </p:nvPicPr>
         <p:blipFill>
-          <a:blip r:embed="rId3" cstate="print">
+          <a:blip r:embed="rId6" cstate="print">
             <a:extLst>
               <a:ext uri="{28A0092B-C50C-407E-A947-70E740481C1C}">
                 <a14:useLocalDpi xmlns:a14="http://schemas.microsoft.com/office/drawing/2010/main" val="0"/>
@@ -6708,7 +6699,7 @@
           <p:nvPr/>
         </p:nvPicPr>
         <p:blipFill>
-          <a:blip r:embed="rId4" cstate="print">
+          <a:blip r:embed="rId7" cstate="print">
             <a:extLst>
               <a:ext uri="{28A0092B-C50C-407E-A947-70E740481C1C}">
                 <a14:useLocalDpi xmlns:a14="http://schemas.microsoft.com/office/drawing/2010/main" val="0"/>
@@ -6747,7 +6738,7 @@
           <p:nvPr/>
         </p:nvPicPr>
         <p:blipFill>
-          <a:blip r:embed="rId5" cstate="print">
+          <a:blip r:embed="rId8" cstate="print">
             <a:extLst>
               <a:ext uri="{28A0092B-C50C-407E-A947-70E740481C1C}">
                 <a14:useLocalDpi xmlns:a14="http://schemas.microsoft.com/office/drawing/2010/main" val="0"/>
@@ -7027,7 +7018,7 @@
           <p:nvPr/>
         </p:nvPicPr>
         <p:blipFill>
-          <a:blip r:embed="rId6"/>
+          <a:blip r:embed="rId9"/>
           <a:stretch>
             <a:fillRect/>
           </a:stretch>
@@ -7055,7 +7046,7 @@
           <p:nvPr/>
         </p:nvPicPr>
         <p:blipFill>
-          <a:blip r:embed="rId7"/>
+          <a:blip r:embed="rId10"/>
           <a:stretch>
             <a:fillRect/>
           </a:stretch>
@@ -7083,7 +7074,7 @@
           <p:nvPr/>
         </p:nvPicPr>
         <p:blipFill>
-          <a:blip r:embed="rId8"/>
+          <a:blip r:embed="rId11"/>
           <a:stretch>
             <a:fillRect/>
           </a:stretch>
@@ -7111,7 +7102,7 @@
           <p:nvPr/>
         </p:nvPicPr>
         <p:blipFill>
-          <a:blip r:embed="rId9"/>
+          <a:blip r:embed="rId12"/>
           <a:stretch>
             <a:fillRect/>
           </a:stretch>
@@ -7139,7 +7130,7 @@
           <p:nvPr/>
         </p:nvPicPr>
         <p:blipFill>
-          <a:blip r:embed="rId10"/>
+          <a:blip r:embed="rId13"/>
           <a:stretch>
             <a:fillRect/>
           </a:stretch>
@@ -7167,7 +7158,7 @@
           <p:nvPr/>
         </p:nvPicPr>
         <p:blipFill>
-          <a:blip r:embed="rId11"/>
+          <a:blip r:embed="rId14"/>
           <a:stretch>
             <a:fillRect/>
           </a:stretch>
@@ -7195,7 +7186,7 @@
           <p:nvPr/>
         </p:nvPicPr>
         <p:blipFill>
-          <a:blip r:embed="rId12"/>
+          <a:blip r:embed="rId15"/>
           <a:stretch>
             <a:fillRect/>
           </a:stretch>
@@ -7223,7 +7214,7 @@
           <p:nvPr/>
         </p:nvPicPr>
         <p:blipFill>
-          <a:blip r:embed="rId13"/>
+          <a:blip r:embed="rId16"/>
           <a:stretch>
             <a:fillRect/>
           </a:stretch>
@@ -7922,6 +7913,148 @@
           </a:p>
           <a:p>
             <a:endParaRPr lang="en-US" sz="2400" dirty="0"/>
+          </a:p>
+        </p:txBody>
+      </p:sp>
+      <p:pic>
+        <p:nvPicPr>
+          <p:cNvPr id="11" name="Graphic 10">
+            <a:extLst>
+              <a:ext uri="{FF2B5EF4-FFF2-40B4-BE49-F238E27FC236}">
+                <a16:creationId xmlns:a16="http://schemas.microsoft.com/office/drawing/2014/main" id="{F4B4AD18-3A0C-4035-B2AB-E0A754155FD0}"/>
+              </a:ext>
+            </a:extLst>
+          </p:cNvPr>
+          <p:cNvPicPr>
+            <a:picLocks noChangeAspect="1"/>
+          </p:cNvPicPr>
+          <p:nvPr/>
+        </p:nvPicPr>
+        <p:blipFill>
+          <a:blip r:embed="rId17">
+            <a:extLst>
+              <a:ext uri="{96DAC541-7B7A-43D3-8B79-37D633B846F1}">
+                <asvg:svgBlip xmlns:asvg="http://schemas.microsoft.com/office/drawing/2016/SVG/main" r:embed="rId18"/>
+              </a:ext>
+            </a:extLst>
+          </a:blip>
+          <a:stretch>
+            <a:fillRect/>
+          </a:stretch>
+        </p:blipFill>
+        <p:spPr>
+          <a:xfrm>
+            <a:off x="38191990" y="13717017"/>
+            <a:ext cx="3932321" cy="3560711"/>
+          </a:xfrm>
+          <a:prstGeom prst="rect">
+            <a:avLst/>
+          </a:prstGeom>
+        </p:spPr>
+      </p:pic>
+      <p:pic>
+        <p:nvPicPr>
+          <p:cNvPr id="12" name="Picture 11">
+            <a:extLst>
+              <a:ext uri="{FF2B5EF4-FFF2-40B4-BE49-F238E27FC236}">
+                <a16:creationId xmlns:a16="http://schemas.microsoft.com/office/drawing/2014/main" id="{1D7B0A30-3CC7-4275-AEB3-F938121FC9DC}"/>
+              </a:ext>
+            </a:extLst>
+          </p:cNvPr>
+          <p:cNvPicPr>
+            <a:picLocks noChangeAspect="1"/>
+          </p:cNvPicPr>
+          <p:nvPr/>
+        </p:nvPicPr>
+        <p:blipFill>
+          <a:blip r:embed="rId19"/>
+          <a:stretch>
+            <a:fillRect/>
+          </a:stretch>
+        </p:blipFill>
+        <p:spPr>
+          <a:xfrm rot="16200000">
+            <a:off x="39016415" y="6985801"/>
+            <a:ext cx="2503144" cy="5357606"/>
+          </a:xfrm>
+          <a:prstGeom prst="rect">
+            <a:avLst/>
+          </a:prstGeom>
+        </p:spPr>
+      </p:pic>
+      <p:sp>
+        <p:nvSpPr>
+          <p:cNvPr id="54" name="TextBox 53">
+            <a:extLst>
+              <a:ext uri="{FF2B5EF4-FFF2-40B4-BE49-F238E27FC236}">
+                <a16:creationId xmlns:a16="http://schemas.microsoft.com/office/drawing/2014/main" id="{83EB19AC-71BD-4E37-8A5E-E30F5CB98501}"/>
+              </a:ext>
+            </a:extLst>
+          </p:cNvPr>
+          <p:cNvSpPr txBox="1"/>
+          <p:nvPr/>
+        </p:nvSpPr>
+        <p:spPr>
+          <a:xfrm>
+            <a:off x="33739380" y="15061118"/>
+            <a:ext cx="3225752" cy="769441"/>
+          </a:xfrm>
+          <a:prstGeom prst="rect">
+            <a:avLst/>
+          </a:prstGeom>
+          <a:noFill/>
+        </p:spPr>
+        <p:txBody>
+          <a:bodyPr wrap="square" rtlCol="0">
+            <a:spAutoFit/>
+          </a:bodyPr>
+          <a:lstStyle/>
+          <a:p>
+            <a:r>
+              <a:rPr lang="en-US" sz="2200" b="1" i="1" dirty="0">
+                <a:latin typeface="Times New Roman" panose="02020603050405020304" pitchFamily="18" charset="0"/>
+                <a:cs typeface="Times New Roman" panose="02020603050405020304" pitchFamily="18" charset="0"/>
+              </a:rPr>
+              <a:t>Final Enclosure Design(CorelDraw)</a:t>
+            </a:r>
+          </a:p>
+        </p:txBody>
+      </p:sp>
+      <p:sp>
+        <p:nvSpPr>
+          <p:cNvPr id="55" name="TextBox 54">
+            <a:extLst>
+              <a:ext uri="{FF2B5EF4-FFF2-40B4-BE49-F238E27FC236}">
+                <a16:creationId xmlns:a16="http://schemas.microsoft.com/office/drawing/2014/main" id="{5422E1DB-C36E-4CC1-A5A3-91E722EB7E83}"/>
+              </a:ext>
+            </a:extLst>
+          </p:cNvPr>
+          <p:cNvSpPr txBox="1"/>
+          <p:nvPr/>
+        </p:nvSpPr>
+        <p:spPr>
+          <a:xfrm>
+            <a:off x="33668248" y="9270333"/>
+            <a:ext cx="3225752" cy="769441"/>
+          </a:xfrm>
+          <a:prstGeom prst="rect">
+            <a:avLst/>
+          </a:prstGeom>
+          <a:noFill/>
+        </p:spPr>
+        <p:txBody>
+          <a:bodyPr wrap="square" rtlCol="0">
+            <a:spAutoFit/>
+          </a:bodyPr>
+          <a:lstStyle/>
+          <a:p>
+            <a:r>
+              <a:rPr lang="en-US" sz="2200" b="1" i="1" dirty="0">
+                <a:latin typeface="Times New Roman" panose="02020603050405020304" pitchFamily="18" charset="0"/>
+                <a:cs typeface="Times New Roman" panose="02020603050405020304" pitchFamily="18" charset="0"/>
+              </a:rPr>
+              <a:t>Parking Lot Prototype Design(Inkscape)</a:t>
+            </a:r>
           </a:p>
         </p:txBody>
       </p:sp>

</xml_diff>